<commit_message>
[Tutorial] Update button tutorial
Signed-off-by: Jiyun Yang <ji.yang@samsung.com>
</commit_message>
<xml_diff>
--- a/Tutorial/Components/1_Buttons_landscape/button_landscape_설명.pptx
+++ b/Tutorial/Components/1_Buttons_landscape/button_landscape_설명.pptx
@@ -5,22 +5,24 @@
     <p:sldMasterId id="2147483648" r:id="rId1"/>
   </p:sldMasterIdLst>
   <p:notesMasterIdLst>
-    <p:notesMasterId r:id="rId15"/>
+    <p:notesMasterId r:id="rId17"/>
   </p:notesMasterIdLst>
   <p:sldIdLst>
     <p:sldId id="257" r:id="rId2"/>
-    <p:sldId id="259" r:id="rId3"/>
-    <p:sldId id="256" r:id="rId4"/>
-    <p:sldId id="258" r:id="rId5"/>
-    <p:sldId id="260" r:id="rId6"/>
-    <p:sldId id="261" r:id="rId7"/>
-    <p:sldId id="262" r:id="rId8"/>
-    <p:sldId id="263" r:id="rId9"/>
-    <p:sldId id="264" r:id="rId10"/>
-    <p:sldId id="265" r:id="rId11"/>
-    <p:sldId id="266" r:id="rId12"/>
-    <p:sldId id="267" r:id="rId13"/>
-    <p:sldId id="268" r:id="rId14"/>
+    <p:sldId id="270" r:id="rId3"/>
+    <p:sldId id="269" r:id="rId4"/>
+    <p:sldId id="259" r:id="rId5"/>
+    <p:sldId id="256" r:id="rId6"/>
+    <p:sldId id="258" r:id="rId7"/>
+    <p:sldId id="260" r:id="rId8"/>
+    <p:sldId id="261" r:id="rId9"/>
+    <p:sldId id="262" r:id="rId10"/>
+    <p:sldId id="263" r:id="rId11"/>
+    <p:sldId id="264" r:id="rId12"/>
+    <p:sldId id="265" r:id="rId13"/>
+    <p:sldId id="266" r:id="rId14"/>
+    <p:sldId id="267" r:id="rId15"/>
+    <p:sldId id="268" r:id="rId16"/>
   </p:sldIdLst>
   <p:sldSz cx="12192000" cy="6858000"/>
   <p:notesSz cx="6858000" cy="9144000"/>
@@ -542,7 +544,7 @@
           <a:p>
             <a:fld id="{BCE6D568-5584-8046-A6E7-98755376A677}" type="slidenum">
               <a:rPr kumimoji="1" lang="ko-Kore-KR" altLang="en-US" smtClean="0"/>
-              <a:t>12</a:t>
+              <a:t>14</a:t>
             </a:fld>
             <a:endParaRPr kumimoji="1" lang="ko-Kore-KR" altLang="en-US"/>
           </a:p>
@@ -3926,6 +3928,1381 @@
           <a:chExt cx="0" cy="0"/>
         </a:xfrm>
       </p:grpSpPr>
+      <p:sp>
+        <p:nvSpPr>
+          <p:cNvPr id="4" name="TextBox 3">
+            <a:extLst>
+              <a:ext uri="{FF2B5EF4-FFF2-40B4-BE49-F238E27FC236}">
+                <a16:creationId xmlns:a16="http://schemas.microsoft.com/office/drawing/2014/main" id="{15F56F27-DB5D-C645-8F0F-6F398574EE57}"/>
+              </a:ext>
+            </a:extLst>
+          </p:cNvPr>
+          <p:cNvSpPr txBox="1"/>
+          <p:nvPr/>
+        </p:nvSpPr>
+        <p:spPr>
+          <a:xfrm>
+            <a:off x="6487" y="1977957"/>
+            <a:ext cx="12192000" cy="3354765"/>
+          </a:xfrm>
+          <a:prstGeom prst="rect">
+            <a:avLst/>
+          </a:prstGeom>
+          <a:noFill/>
+        </p:spPr>
+        <p:txBody>
+          <a:bodyPr wrap="square" rtlCol="0">
+            <a:spAutoFit/>
+          </a:bodyPr>
+          <a:lstStyle/>
+          <a:p>
+            <a:pPr algn="ctr"/>
+            <a:r>
+              <a:rPr kumimoji="1" lang="en-US" altLang="ko-Kore-KR" sz="7200" dirty="0" err="1"/>
+              <a:t>RadioButton</a:t>
+            </a:r>
+            <a:endParaRPr kumimoji="1" lang="en-US" altLang="ko-Kore-KR" sz="7200" dirty="0"/>
+          </a:p>
+          <a:p>
+            <a:pPr algn="ctr"/>
+            <a:r>
+              <a:rPr kumimoji="1" lang="ko-KR" altLang="en-US" sz="2000" dirty="0"/>
+              <a:t>원형 아이콘을 가진 버튼입니다</a:t>
+            </a:r>
+            <a:r>
+              <a:rPr kumimoji="1" lang="en-US" altLang="ko-KR" sz="2000" dirty="0"/>
+              <a:t>.</a:t>
+            </a:r>
+          </a:p>
+          <a:p>
+            <a:pPr algn="ctr"/>
+            <a:endParaRPr kumimoji="1" lang="en-US" altLang="ko-Kore-KR" sz="2000" dirty="0"/>
+          </a:p>
+          <a:p>
+            <a:pPr algn="ctr"/>
+            <a:r>
+              <a:rPr kumimoji="1" lang="ko-Kore-KR" altLang="en-US" sz="2000" dirty="0"/>
+              <a:t>라디오</a:t>
+            </a:r>
+            <a:r>
+              <a:rPr kumimoji="1" lang="ko-KR" altLang="en-US" sz="2000" dirty="0"/>
+              <a:t>버튼과 </a:t>
+            </a:r>
+            <a:r>
+              <a:rPr kumimoji="1" lang="ko-KR" altLang="en-US" sz="2000" dirty="0" err="1"/>
+              <a:t>체크박스의</a:t>
+            </a:r>
+            <a:r>
+              <a:rPr kumimoji="1" lang="ko-KR" altLang="en-US" sz="2000" dirty="0"/>
+              <a:t> 차이점은</a:t>
+            </a:r>
+            <a:endParaRPr kumimoji="1" lang="en-US" altLang="ko-KR" sz="2000" dirty="0"/>
+          </a:p>
+          <a:p>
+            <a:pPr algn="ctr"/>
+            <a:r>
+              <a:rPr kumimoji="1" lang="ko-KR" altLang="en-US" sz="2000" dirty="0" err="1"/>
+              <a:t>그룹핑입니다</a:t>
+            </a:r>
+            <a:r>
+              <a:rPr kumimoji="1" lang="en-US" altLang="ko-KR" sz="2000" dirty="0"/>
+              <a:t>.</a:t>
+            </a:r>
+          </a:p>
+          <a:p>
+            <a:pPr algn="ctr"/>
+            <a:endParaRPr kumimoji="1" lang="en-US" altLang="ko-KR" sz="2000" dirty="0"/>
+          </a:p>
+          <a:p>
+            <a:pPr algn="ctr"/>
+            <a:r>
+              <a:rPr kumimoji="1" lang="ko-KR" altLang="en-US" sz="2000" dirty="0"/>
+              <a:t>라디오 버튼들은 그룹으로 묶을 수 있고</a:t>
+            </a:r>
+            <a:endParaRPr kumimoji="1" lang="en-US" altLang="ko-KR" sz="2000" dirty="0"/>
+          </a:p>
+          <a:p>
+            <a:pPr algn="ctr"/>
+            <a:r>
+              <a:rPr kumimoji="1" lang="ko-KR" altLang="en-US" sz="2000" dirty="0"/>
+              <a:t>한 그룹 안에서는 하나의 라디오버튼만 선택할 수 있습니다</a:t>
+            </a:r>
+            <a:r>
+              <a:rPr kumimoji="1" lang="en-US" altLang="ko-KR" sz="2000" dirty="0"/>
+              <a:t>.</a:t>
+            </a:r>
+            <a:endParaRPr kumimoji="1" lang="ko-Kore-KR" altLang="en-US" sz="2000" dirty="0"/>
+          </a:p>
+        </p:txBody>
+      </p:sp>
+    </p:spTree>
+    <p:extLst>
+      <p:ext uri="{BB962C8B-B14F-4D97-AF65-F5344CB8AC3E}">
+        <p14:creationId xmlns:p14="http://schemas.microsoft.com/office/powerpoint/2010/main" val="2129825057"/>
+      </p:ext>
+    </p:extLst>
+  </p:cSld>
+  <p:clrMapOvr>
+    <a:masterClrMapping/>
+  </p:clrMapOvr>
+</p:sld>
+</file>
+
+<file path=ppt/slides/slide11.xml><?xml version="1.0" encoding="utf-8"?>
+<p:sld xmlns:a="http://schemas.openxmlformats.org/drawingml/2006/main" xmlns:r="http://schemas.openxmlformats.org/officeDocument/2006/relationships" xmlns:p="http://schemas.openxmlformats.org/presentationml/2006/main">
+  <p:cSld>
+    <p:spTree>
+      <p:nvGrpSpPr>
+        <p:cNvPr id="1" name=""/>
+        <p:cNvGrpSpPr/>
+        <p:nvPr/>
+      </p:nvGrpSpPr>
+      <p:grpSpPr>
+        <a:xfrm>
+          <a:off x="0" y="0"/>
+          <a:ext cx="0" cy="0"/>
+          <a:chOff x="0" y="0"/>
+          <a:chExt cx="0" cy="0"/>
+        </a:xfrm>
+      </p:grpSpPr>
+      <p:pic>
+        <p:nvPicPr>
+          <p:cNvPr id="6" name="그림 5">
+            <a:extLst>
+              <a:ext uri="{FF2B5EF4-FFF2-40B4-BE49-F238E27FC236}">
+                <a16:creationId xmlns:a16="http://schemas.microsoft.com/office/drawing/2014/main" id="{236106DF-973E-4F4E-AF8D-4F74AD551616}"/>
+              </a:ext>
+            </a:extLst>
+          </p:cNvPr>
+          <p:cNvPicPr>
+            <a:picLocks noChangeAspect="1"/>
+          </p:cNvPicPr>
+          <p:nvPr/>
+        </p:nvPicPr>
+        <p:blipFill>
+          <a:blip r:embed="rId2"/>
+          <a:stretch>
+            <a:fillRect/>
+          </a:stretch>
+        </p:blipFill>
+        <p:spPr>
+          <a:xfrm>
+            <a:off x="44252" y="0"/>
+            <a:ext cx="12103496" cy="6858000"/>
+          </a:xfrm>
+          <a:prstGeom prst="rect">
+            <a:avLst/>
+          </a:prstGeom>
+        </p:spPr>
+      </p:pic>
+      <p:sp>
+        <p:nvSpPr>
+          <p:cNvPr id="11" name="직사각형 10">
+            <a:extLst>
+              <a:ext uri="{FF2B5EF4-FFF2-40B4-BE49-F238E27FC236}">
+                <a16:creationId xmlns:a16="http://schemas.microsoft.com/office/drawing/2014/main" id="{E6710D9F-0B89-AE46-B8DC-F72FBD6FB158}"/>
+              </a:ext>
+            </a:extLst>
+          </p:cNvPr>
+          <p:cNvSpPr/>
+          <p:nvPr/>
+        </p:nvSpPr>
+        <p:spPr>
+          <a:xfrm>
+            <a:off x="843064" y="3893210"/>
+            <a:ext cx="4753583" cy="1050587"/>
+          </a:xfrm>
+          <a:prstGeom prst="rect">
+            <a:avLst/>
+          </a:prstGeom>
+          <a:noFill/>
+          <a:ln w="28575">
+            <a:solidFill>
+              <a:srgbClr val="FFC000"/>
+            </a:solidFill>
+          </a:ln>
+        </p:spPr>
+        <p:style>
+          <a:lnRef idx="2">
+            <a:schemeClr val="accent1">
+              <a:shade val="50000"/>
+            </a:schemeClr>
+          </a:lnRef>
+          <a:fillRef idx="1">
+            <a:schemeClr val="accent1"/>
+          </a:fillRef>
+          <a:effectRef idx="0">
+            <a:schemeClr val="accent1"/>
+          </a:effectRef>
+          <a:fontRef idx="minor">
+            <a:schemeClr val="lt1"/>
+          </a:fontRef>
+        </p:style>
+        <p:txBody>
+          <a:bodyPr rtlCol="0" anchor="ctr"/>
+          <a:lstStyle/>
+          <a:p>
+            <a:pPr algn="ctr"/>
+            <a:endParaRPr kumimoji="1" lang="ko-Kore-KR" altLang="en-US"/>
+          </a:p>
+        </p:txBody>
+      </p:sp>
+      <p:sp>
+        <p:nvSpPr>
+          <p:cNvPr id="12" name="직사각형 11">
+            <a:extLst>
+              <a:ext uri="{FF2B5EF4-FFF2-40B4-BE49-F238E27FC236}">
+                <a16:creationId xmlns:a16="http://schemas.microsoft.com/office/drawing/2014/main" id="{703B1D49-BD3F-7E4B-90E8-DB6C0D3D764F}"/>
+              </a:ext>
+            </a:extLst>
+          </p:cNvPr>
+          <p:cNvSpPr/>
+          <p:nvPr/>
+        </p:nvSpPr>
+        <p:spPr>
+          <a:xfrm>
+            <a:off x="1952017" y="4943797"/>
+            <a:ext cx="3644630" cy="642026"/>
+          </a:xfrm>
+          <a:prstGeom prst="rect">
+            <a:avLst/>
+          </a:prstGeom>
+          <a:solidFill>
+            <a:srgbClr val="FFC000"/>
+          </a:solidFill>
+          <a:ln w="28575">
+            <a:solidFill>
+              <a:srgbClr val="FFC000"/>
+            </a:solidFill>
+          </a:ln>
+        </p:spPr>
+        <p:style>
+          <a:lnRef idx="2">
+            <a:schemeClr val="accent1">
+              <a:shade val="50000"/>
+            </a:schemeClr>
+          </a:lnRef>
+          <a:fillRef idx="1">
+            <a:schemeClr val="accent1"/>
+          </a:fillRef>
+          <a:effectRef idx="0">
+            <a:schemeClr val="accent1"/>
+          </a:effectRef>
+          <a:fontRef idx="minor">
+            <a:schemeClr val="lt1"/>
+          </a:fontRef>
+        </p:style>
+        <p:txBody>
+          <a:bodyPr rtlCol="0" anchor="t"/>
+          <a:lstStyle/>
+          <a:p>
+            <a:r>
+              <a:rPr kumimoji="1" lang="en-US" altLang="ko-KR" sz="700" dirty="0">
+                <a:solidFill>
+                  <a:schemeClr val="tx1">
+                    <a:lumMod val="75000"/>
+                    <a:lumOff val="25000"/>
+                  </a:schemeClr>
+                </a:solidFill>
+              </a:rPr>
+              <a:t>(1)</a:t>
+            </a:r>
+            <a:r>
+              <a:rPr kumimoji="1" lang="ko-KR" altLang="en-US" sz="700" dirty="0">
+                <a:solidFill>
+                  <a:schemeClr val="tx1">
+                    <a:lumMod val="75000"/>
+                    <a:lumOff val="25000"/>
+                  </a:schemeClr>
+                </a:solidFill>
+              </a:rPr>
+              <a:t> </a:t>
+            </a:r>
+            <a:r>
+              <a:rPr kumimoji="1" lang="ko-KR" altLang="en-US" sz="700" dirty="0" err="1">
+                <a:solidFill>
+                  <a:schemeClr val="tx1">
+                    <a:lumMod val="75000"/>
+                    <a:lumOff val="25000"/>
+                  </a:schemeClr>
+                </a:solidFill>
+              </a:rPr>
+              <a:t>라디오버튼</a:t>
+            </a:r>
+            <a:r>
+              <a:rPr kumimoji="1" lang="ko-KR" altLang="en-US" sz="700" dirty="0">
+                <a:solidFill>
+                  <a:schemeClr val="tx1">
+                    <a:lumMod val="75000"/>
+                    <a:lumOff val="25000"/>
+                  </a:schemeClr>
+                </a:solidFill>
+              </a:rPr>
+              <a:t> </a:t>
+            </a:r>
+            <a:r>
+              <a:rPr kumimoji="1" lang="en-US" altLang="ko-KR" sz="700" dirty="0">
+                <a:solidFill>
+                  <a:schemeClr val="tx1">
+                    <a:lumMod val="75000"/>
+                    <a:lumOff val="25000"/>
+                  </a:schemeClr>
+                </a:solidFill>
+              </a:rPr>
+              <a:t>3</a:t>
+            </a:r>
+            <a:r>
+              <a:rPr kumimoji="1" lang="ko-KR" altLang="en-US" sz="700" dirty="0">
+                <a:solidFill>
+                  <a:schemeClr val="tx1">
+                    <a:lumMod val="75000"/>
+                    <a:lumOff val="25000"/>
+                  </a:schemeClr>
+                </a:solidFill>
+              </a:rPr>
+              <a:t>개 배치</a:t>
+            </a:r>
+            <a:endParaRPr kumimoji="1" lang="en-US" altLang="ko-KR" sz="700" dirty="0">
+              <a:solidFill>
+                <a:schemeClr val="tx1">
+                  <a:lumMod val="75000"/>
+                  <a:lumOff val="25000"/>
+                </a:schemeClr>
+              </a:solidFill>
+            </a:endParaRPr>
+          </a:p>
+          <a:p>
+            <a:pPr marL="171450" indent="-171450">
+              <a:buFont typeface="Arial" panose="020B0604020202020204" pitchFamily="34" charset="0"/>
+              <a:buChar char="•"/>
+            </a:pPr>
+            <a:r>
+              <a:rPr kumimoji="1" lang="ko-KR" altLang="en-US" sz="700" dirty="0">
+                <a:solidFill>
+                  <a:schemeClr val="tx1">
+                    <a:lumMod val="75000"/>
+                    <a:lumOff val="25000"/>
+                  </a:schemeClr>
+                </a:solidFill>
+              </a:rPr>
+              <a:t>라디오버튼들을 감싸는 부모 </a:t>
+            </a:r>
+            <a:r>
+              <a:rPr kumimoji="1" lang="en-US" altLang="ko-KR" sz="700" dirty="0">
+                <a:solidFill>
+                  <a:schemeClr val="tx1">
+                    <a:lumMod val="75000"/>
+                    <a:lumOff val="25000"/>
+                  </a:schemeClr>
+                </a:solidFill>
+              </a:rPr>
+              <a:t>View</a:t>
+            </a:r>
+            <a:r>
+              <a:rPr kumimoji="1" lang="ko-KR" altLang="en-US" sz="700" dirty="0">
+                <a:solidFill>
+                  <a:schemeClr val="tx1">
+                    <a:lumMod val="75000"/>
+                    <a:lumOff val="25000"/>
+                  </a:schemeClr>
+                </a:solidFill>
+              </a:rPr>
+              <a:t>에 </a:t>
+            </a:r>
+            <a:r>
+              <a:rPr kumimoji="1" lang="en-US" altLang="ko-KR" sz="700" dirty="0">
+                <a:solidFill>
+                  <a:schemeClr val="tx1">
+                    <a:lumMod val="75000"/>
+                    <a:lumOff val="25000"/>
+                  </a:schemeClr>
+                </a:solidFill>
+              </a:rPr>
+              <a:t>“</a:t>
+            </a:r>
+            <a:r>
+              <a:rPr kumimoji="1" lang="en-US" altLang="ko-KR" sz="700" dirty="0" err="1">
+                <a:solidFill>
+                  <a:schemeClr val="tx1">
+                    <a:lumMod val="75000"/>
+                    <a:lumOff val="25000"/>
+                  </a:schemeClr>
+                </a:solidFill>
+              </a:rPr>
+              <a:t>RadioButtonGroup.IsGroupHolder</a:t>
+            </a:r>
+            <a:r>
+              <a:rPr kumimoji="1" lang="en-US" altLang="ko-KR" sz="700" dirty="0">
+                <a:solidFill>
+                  <a:schemeClr val="tx1">
+                    <a:lumMod val="75000"/>
+                    <a:lumOff val="25000"/>
+                  </a:schemeClr>
+                </a:solidFill>
+              </a:rPr>
+              <a:t>” </a:t>
+            </a:r>
+            <a:r>
+              <a:rPr kumimoji="1" lang="ko-KR" altLang="en-US" sz="700" dirty="0" err="1">
+                <a:solidFill>
+                  <a:schemeClr val="tx1">
+                    <a:lumMod val="75000"/>
+                    <a:lumOff val="25000"/>
+                  </a:schemeClr>
+                </a:solidFill>
+              </a:rPr>
+              <a:t>를</a:t>
+            </a:r>
+            <a:r>
+              <a:rPr kumimoji="1" lang="ko-KR" altLang="en-US" sz="700" dirty="0">
+                <a:solidFill>
+                  <a:schemeClr val="tx1">
+                    <a:lumMod val="75000"/>
+                    <a:lumOff val="25000"/>
+                  </a:schemeClr>
+                </a:solidFill>
+              </a:rPr>
+              <a:t> </a:t>
+            </a:r>
+            <a:r>
+              <a:rPr kumimoji="1" lang="en-US" altLang="ko-KR" sz="700" dirty="0">
+                <a:solidFill>
+                  <a:schemeClr val="tx1">
+                    <a:lumMod val="75000"/>
+                    <a:lumOff val="25000"/>
+                  </a:schemeClr>
+                </a:solidFill>
+              </a:rPr>
+              <a:t>true</a:t>
+            </a:r>
+            <a:r>
+              <a:rPr kumimoji="1" lang="ko-KR" altLang="en-US" sz="700" dirty="0">
+                <a:solidFill>
+                  <a:schemeClr val="tx1">
+                    <a:lumMod val="75000"/>
+                    <a:lumOff val="25000"/>
+                  </a:schemeClr>
+                </a:solidFill>
+              </a:rPr>
+              <a:t> 로 설정해 주면</a:t>
+            </a:r>
+            <a:r>
+              <a:rPr kumimoji="1" lang="en-US" altLang="ko-KR" sz="700" dirty="0">
+                <a:solidFill>
+                  <a:schemeClr val="tx1">
+                    <a:lumMod val="75000"/>
+                    <a:lumOff val="25000"/>
+                  </a:schemeClr>
+                </a:solidFill>
+              </a:rPr>
+              <a:t>,</a:t>
+            </a:r>
+            <a:r>
+              <a:rPr kumimoji="1" lang="ko-KR" altLang="en-US" sz="700" dirty="0">
+                <a:solidFill>
+                  <a:schemeClr val="tx1">
+                    <a:lumMod val="75000"/>
+                    <a:lumOff val="25000"/>
+                  </a:schemeClr>
+                </a:solidFill>
+              </a:rPr>
+              <a:t> </a:t>
+            </a:r>
+            <a:r>
+              <a:rPr kumimoji="1" lang="en-US" altLang="ko-KR" sz="700" dirty="0">
+                <a:solidFill>
+                  <a:schemeClr val="tx1">
+                    <a:lumMod val="75000"/>
+                    <a:lumOff val="25000"/>
+                  </a:schemeClr>
+                </a:solidFill>
+              </a:rPr>
+              <a:t> </a:t>
+            </a:r>
+            <a:r>
+              <a:rPr kumimoji="1" lang="ko-KR" altLang="en-US" sz="700" dirty="0">
+                <a:solidFill>
+                  <a:schemeClr val="tx1">
+                    <a:lumMod val="75000"/>
+                    <a:lumOff val="25000"/>
+                  </a:schemeClr>
+                </a:solidFill>
+              </a:rPr>
+              <a:t>자식들이 하나의 그룹으로 묶여서 동작함</a:t>
+            </a:r>
+            <a:r>
+              <a:rPr kumimoji="1" lang="en-US" altLang="ko-KR" sz="700" dirty="0">
+                <a:solidFill>
+                  <a:schemeClr val="tx1">
+                    <a:lumMod val="75000"/>
+                    <a:lumOff val="25000"/>
+                  </a:schemeClr>
+                </a:solidFill>
+              </a:rPr>
+              <a:t>.</a:t>
+            </a:r>
+            <a:br>
+              <a:rPr kumimoji="1" lang="en-US" altLang="ko-KR" sz="700" dirty="0">
+                <a:solidFill>
+                  <a:schemeClr val="tx1">
+                    <a:lumMod val="75000"/>
+                    <a:lumOff val="25000"/>
+                  </a:schemeClr>
+                </a:solidFill>
+              </a:rPr>
+            </a:br>
+            <a:endParaRPr kumimoji="1" lang="en-US" altLang="ko-KR" sz="700" dirty="0">
+              <a:solidFill>
+                <a:schemeClr val="tx1">
+                  <a:lumMod val="75000"/>
+                  <a:lumOff val="25000"/>
+                </a:schemeClr>
+              </a:solidFill>
+            </a:endParaRPr>
+          </a:p>
+          <a:p>
+            <a:pPr marL="171450" indent="-171450">
+              <a:buFont typeface="Arial" panose="020B0604020202020204" pitchFamily="34" charset="0"/>
+              <a:buChar char="•"/>
+            </a:pPr>
+            <a:r>
+              <a:rPr kumimoji="1" lang="ko-KR" altLang="en-US" sz="700" dirty="0">
+                <a:solidFill>
+                  <a:schemeClr val="tx1">
+                    <a:lumMod val="75000"/>
+                    <a:lumOff val="25000"/>
+                  </a:schemeClr>
+                </a:solidFill>
+              </a:rPr>
+              <a:t>첫번째 라디오버튼에 </a:t>
+            </a:r>
+            <a:r>
+              <a:rPr kumimoji="1" lang="en-US" altLang="ko-KR" sz="700" dirty="0" err="1">
+                <a:solidFill>
+                  <a:schemeClr val="tx1">
+                    <a:lumMod val="75000"/>
+                    <a:lumOff val="25000"/>
+                  </a:schemeClr>
+                </a:solidFill>
+              </a:rPr>
+              <a:t>IsSelected</a:t>
+            </a:r>
+            <a:r>
+              <a:rPr kumimoji="1" lang="en-US" altLang="ko-KR" sz="700" dirty="0">
+                <a:solidFill>
+                  <a:schemeClr val="tx1">
+                    <a:lumMod val="75000"/>
+                    <a:lumOff val="25000"/>
+                  </a:schemeClr>
+                </a:solidFill>
+              </a:rPr>
+              <a:t>=True</a:t>
+            </a:r>
+            <a:r>
+              <a:rPr kumimoji="1" lang="ko-KR" altLang="en-US" sz="700" dirty="0" err="1">
+                <a:solidFill>
+                  <a:schemeClr val="tx1">
+                    <a:lumMod val="75000"/>
+                    <a:lumOff val="25000"/>
+                  </a:schemeClr>
+                </a:solidFill>
+              </a:rPr>
+              <a:t>를</a:t>
+            </a:r>
+            <a:r>
+              <a:rPr kumimoji="1" lang="ko-KR" altLang="en-US" sz="700" dirty="0">
+                <a:solidFill>
+                  <a:schemeClr val="tx1">
+                    <a:lumMod val="75000"/>
+                    <a:lumOff val="25000"/>
+                  </a:schemeClr>
+                </a:solidFill>
+              </a:rPr>
+              <a:t> 설정하여 선택된 상태로 시작하도록 해봤음</a:t>
+            </a:r>
+            <a:r>
+              <a:rPr kumimoji="1" lang="en-US" altLang="ko-KR" sz="700" dirty="0">
+                <a:solidFill>
+                  <a:schemeClr val="tx1">
+                    <a:lumMod val="75000"/>
+                    <a:lumOff val="25000"/>
+                  </a:schemeClr>
+                </a:solidFill>
+              </a:rPr>
+              <a:t>.</a:t>
+            </a:r>
+            <a:r>
+              <a:rPr kumimoji="1" lang="ko-KR" altLang="en-US" sz="700" dirty="0">
+                <a:solidFill>
+                  <a:schemeClr val="tx1">
+                    <a:lumMod val="75000"/>
+                    <a:lumOff val="25000"/>
+                  </a:schemeClr>
+                </a:solidFill>
+              </a:rPr>
+              <a:t> </a:t>
+            </a:r>
+            <a:endParaRPr kumimoji="1" lang="en-US" altLang="ko-KR" sz="700" dirty="0">
+              <a:solidFill>
+                <a:schemeClr val="tx1">
+                  <a:lumMod val="75000"/>
+                  <a:lumOff val="25000"/>
+                </a:schemeClr>
+              </a:solidFill>
+            </a:endParaRPr>
+          </a:p>
+        </p:txBody>
+      </p:sp>
+      <p:sp>
+        <p:nvSpPr>
+          <p:cNvPr id="17" name="직사각형 16">
+            <a:extLst>
+              <a:ext uri="{FF2B5EF4-FFF2-40B4-BE49-F238E27FC236}">
+                <a16:creationId xmlns:a16="http://schemas.microsoft.com/office/drawing/2014/main" id="{19500AC4-00F2-9B48-97AF-48FD297C811E}"/>
+              </a:ext>
+            </a:extLst>
+          </p:cNvPr>
+          <p:cNvSpPr/>
+          <p:nvPr/>
+        </p:nvSpPr>
+        <p:spPr>
+          <a:xfrm>
+            <a:off x="6809874" y="1966628"/>
+            <a:ext cx="4202429" cy="239949"/>
+          </a:xfrm>
+          <a:prstGeom prst="rect">
+            <a:avLst/>
+          </a:prstGeom>
+          <a:noFill/>
+          <a:ln w="28575">
+            <a:solidFill>
+              <a:srgbClr val="FFC000"/>
+            </a:solidFill>
+          </a:ln>
+        </p:spPr>
+        <p:style>
+          <a:lnRef idx="2">
+            <a:schemeClr val="accent1">
+              <a:shade val="50000"/>
+            </a:schemeClr>
+          </a:lnRef>
+          <a:fillRef idx="1">
+            <a:schemeClr val="accent1"/>
+          </a:fillRef>
+          <a:effectRef idx="0">
+            <a:schemeClr val="accent1"/>
+          </a:effectRef>
+          <a:fontRef idx="minor">
+            <a:schemeClr val="lt1"/>
+          </a:fontRef>
+        </p:style>
+        <p:txBody>
+          <a:bodyPr rtlCol="0" anchor="ctr"/>
+          <a:lstStyle/>
+          <a:p>
+            <a:pPr algn="ctr"/>
+            <a:endParaRPr kumimoji="1" lang="ko-Kore-KR" altLang="en-US"/>
+          </a:p>
+        </p:txBody>
+      </p:sp>
+      <p:sp>
+        <p:nvSpPr>
+          <p:cNvPr id="18" name="직사각형 17">
+            <a:extLst>
+              <a:ext uri="{FF2B5EF4-FFF2-40B4-BE49-F238E27FC236}">
+                <a16:creationId xmlns:a16="http://schemas.microsoft.com/office/drawing/2014/main" id="{FC7A2776-37FF-E84E-A6CE-CDF1C6F045BA}"/>
+              </a:ext>
+            </a:extLst>
+          </p:cNvPr>
+          <p:cNvSpPr/>
+          <p:nvPr/>
+        </p:nvSpPr>
+        <p:spPr>
+          <a:xfrm>
+            <a:off x="8502567" y="2225985"/>
+            <a:ext cx="2509736" cy="713360"/>
+          </a:xfrm>
+          <a:prstGeom prst="rect">
+            <a:avLst/>
+          </a:prstGeom>
+          <a:solidFill>
+            <a:srgbClr val="FFC000"/>
+          </a:solidFill>
+          <a:ln w="28575">
+            <a:solidFill>
+              <a:srgbClr val="FFC000"/>
+            </a:solidFill>
+          </a:ln>
+        </p:spPr>
+        <p:style>
+          <a:lnRef idx="2">
+            <a:schemeClr val="accent1">
+              <a:shade val="50000"/>
+            </a:schemeClr>
+          </a:lnRef>
+          <a:fillRef idx="1">
+            <a:schemeClr val="accent1"/>
+          </a:fillRef>
+          <a:effectRef idx="0">
+            <a:schemeClr val="accent1"/>
+          </a:effectRef>
+          <a:fontRef idx="minor">
+            <a:schemeClr val="lt1"/>
+          </a:fontRef>
+        </p:style>
+        <p:txBody>
+          <a:bodyPr rtlCol="0" anchor="t"/>
+          <a:lstStyle/>
+          <a:p>
+            <a:r>
+              <a:rPr kumimoji="1" lang="en-US" altLang="ko-KR" sz="700" dirty="0">
+                <a:solidFill>
+                  <a:schemeClr val="tx1">
+                    <a:lumMod val="75000"/>
+                    <a:lumOff val="25000"/>
+                  </a:schemeClr>
+                </a:solidFill>
+              </a:rPr>
+              <a:t>(2)</a:t>
+            </a:r>
+            <a:r>
+              <a:rPr kumimoji="1" lang="ko-KR" altLang="en-US" sz="700" dirty="0">
+                <a:solidFill>
+                  <a:schemeClr val="tx1">
+                    <a:lumMod val="75000"/>
+                    <a:lumOff val="25000"/>
+                  </a:schemeClr>
+                </a:solidFill>
+              </a:rPr>
+              <a:t> 라디오 버튼에서 그룹을 가져와서 </a:t>
+            </a:r>
+            <a:r>
+              <a:rPr kumimoji="1" lang="en-US" altLang="ko-KR" sz="700" dirty="0" err="1">
+                <a:solidFill>
+                  <a:schemeClr val="tx1">
+                    <a:lumMod val="75000"/>
+                    <a:lumOff val="25000"/>
+                  </a:schemeClr>
+                </a:solidFill>
+              </a:rPr>
+              <a:t>SelectedChanged</a:t>
+            </a:r>
+            <a:r>
+              <a:rPr kumimoji="1" lang="en-US" altLang="ko-KR" sz="700" dirty="0">
+                <a:solidFill>
+                  <a:schemeClr val="tx1">
+                    <a:lumMod val="75000"/>
+                    <a:lumOff val="25000"/>
+                  </a:schemeClr>
+                </a:solidFill>
+              </a:rPr>
+              <a:t> </a:t>
+            </a:r>
+            <a:r>
+              <a:rPr kumimoji="1" lang="ko-KR" altLang="en-US" sz="700" dirty="0">
+                <a:solidFill>
+                  <a:schemeClr val="tx1">
+                    <a:lumMod val="75000"/>
+                    <a:lumOff val="25000"/>
+                  </a:schemeClr>
+                </a:solidFill>
+              </a:rPr>
+              <a:t>이벤트를 리슨</a:t>
+            </a:r>
+            <a:r>
+              <a:rPr kumimoji="1" lang="en-US" altLang="ko-KR" sz="700" dirty="0">
+                <a:solidFill>
+                  <a:schemeClr val="tx1">
+                    <a:lumMod val="75000"/>
+                    <a:lumOff val="25000"/>
+                  </a:schemeClr>
+                </a:solidFill>
+              </a:rPr>
+              <a:t>!</a:t>
+            </a:r>
+          </a:p>
+          <a:p>
+            <a:endParaRPr kumimoji="1" lang="en-US" altLang="ko-KR" sz="700" dirty="0">
+              <a:solidFill>
+                <a:schemeClr val="tx1">
+                  <a:lumMod val="75000"/>
+                  <a:lumOff val="25000"/>
+                </a:schemeClr>
+              </a:solidFill>
+            </a:endParaRPr>
+          </a:p>
+          <a:p>
+            <a:r>
+              <a:rPr kumimoji="1" lang="ko-KR" altLang="en-US" sz="700" dirty="0">
+                <a:solidFill>
+                  <a:schemeClr val="tx1">
+                    <a:lumMod val="75000"/>
+                    <a:lumOff val="25000"/>
+                  </a:schemeClr>
+                </a:solidFill>
+              </a:rPr>
+              <a:t>* </a:t>
+            </a:r>
+            <a:r>
+              <a:rPr kumimoji="1" lang="ko-KR" altLang="en-US" sz="700" dirty="0" err="1">
+                <a:solidFill>
+                  <a:schemeClr val="tx1">
+                    <a:lumMod val="75000"/>
+                    <a:lumOff val="25000"/>
+                  </a:schemeClr>
+                </a:solidFill>
+              </a:rPr>
+              <a:t>주의할점</a:t>
+            </a:r>
+            <a:r>
+              <a:rPr kumimoji="1" lang="en-US" altLang="ko-KR" sz="700" dirty="0">
+                <a:solidFill>
+                  <a:schemeClr val="tx1">
+                    <a:lumMod val="75000"/>
+                    <a:lumOff val="25000"/>
+                  </a:schemeClr>
+                </a:solidFill>
+              </a:rPr>
+              <a:t>:</a:t>
+            </a:r>
+            <a:r>
+              <a:rPr kumimoji="1" lang="ko-KR" altLang="en-US" sz="700" dirty="0">
+                <a:solidFill>
+                  <a:schemeClr val="tx1">
+                    <a:lumMod val="75000"/>
+                    <a:lumOff val="25000"/>
+                  </a:schemeClr>
+                </a:solidFill>
+              </a:rPr>
+              <a:t> </a:t>
+            </a:r>
+            <a:r>
+              <a:rPr kumimoji="1" lang="en-US" altLang="ko-KR" sz="700" dirty="0" err="1">
+                <a:solidFill>
+                  <a:schemeClr val="tx1">
+                    <a:lumMod val="75000"/>
+                    <a:lumOff val="25000"/>
+                  </a:schemeClr>
+                </a:solidFill>
+              </a:rPr>
+              <a:t>xaml</a:t>
+            </a:r>
+            <a:r>
+              <a:rPr kumimoji="1" lang="ko-KR" altLang="en-US" sz="700" dirty="0">
+                <a:solidFill>
+                  <a:schemeClr val="tx1">
+                    <a:lumMod val="75000"/>
+                    <a:lumOff val="25000"/>
+                  </a:schemeClr>
+                </a:solidFill>
+              </a:rPr>
+              <a:t>에서 </a:t>
+            </a:r>
+            <a:r>
+              <a:rPr kumimoji="1" lang="en-US" altLang="ko-KR" sz="700" dirty="0" err="1">
+                <a:solidFill>
+                  <a:schemeClr val="tx1">
+                    <a:lumMod val="75000"/>
+                    <a:lumOff val="25000"/>
+                  </a:schemeClr>
+                </a:solidFill>
+              </a:rPr>
+              <a:t>IsGroupHolder</a:t>
+            </a:r>
+            <a:r>
+              <a:rPr kumimoji="1" lang="ko-KR" altLang="en-US" sz="700" dirty="0" err="1">
+                <a:solidFill>
+                  <a:schemeClr val="tx1">
+                    <a:lumMod val="75000"/>
+                    <a:lumOff val="25000"/>
+                  </a:schemeClr>
+                </a:solidFill>
+              </a:rPr>
+              <a:t>를</a:t>
+            </a:r>
+            <a:r>
+              <a:rPr kumimoji="1" lang="ko-KR" altLang="en-US" sz="700" dirty="0">
+                <a:solidFill>
+                  <a:schemeClr val="tx1">
+                    <a:lumMod val="75000"/>
+                    <a:lumOff val="25000"/>
+                  </a:schemeClr>
+                </a:solidFill>
+              </a:rPr>
+              <a:t> </a:t>
+            </a:r>
+            <a:r>
+              <a:rPr kumimoji="1" lang="en-US" altLang="ko-KR" sz="700" dirty="0">
+                <a:solidFill>
+                  <a:schemeClr val="tx1">
+                    <a:lumMod val="75000"/>
+                    <a:lumOff val="25000"/>
+                  </a:schemeClr>
+                </a:solidFill>
+              </a:rPr>
+              <a:t>true</a:t>
+            </a:r>
+            <a:r>
+              <a:rPr kumimoji="1" lang="ko-KR" altLang="en-US" sz="700" dirty="0">
+                <a:solidFill>
+                  <a:schemeClr val="tx1">
+                    <a:lumMod val="75000"/>
+                    <a:lumOff val="25000"/>
+                  </a:schemeClr>
+                </a:solidFill>
+              </a:rPr>
+              <a:t>로 설정하지 않았다면</a:t>
+            </a:r>
+            <a:r>
+              <a:rPr kumimoji="1" lang="en-US" altLang="ko-KR" sz="700" dirty="0">
+                <a:solidFill>
+                  <a:schemeClr val="tx1">
+                    <a:lumMod val="75000"/>
+                    <a:lumOff val="25000"/>
+                  </a:schemeClr>
+                </a:solidFill>
+              </a:rPr>
+              <a:t>,</a:t>
+            </a:r>
+            <a:r>
+              <a:rPr kumimoji="1" lang="ko-KR" altLang="en-US" sz="700" dirty="0">
+                <a:solidFill>
+                  <a:schemeClr val="tx1">
+                    <a:lumMod val="75000"/>
+                    <a:lumOff val="25000"/>
+                  </a:schemeClr>
+                </a:solidFill>
+              </a:rPr>
+              <a:t>  그룹이 생성되지 않으므로 </a:t>
+            </a:r>
+            <a:r>
+              <a:rPr kumimoji="1" lang="en-US" altLang="ko-KR" sz="700" dirty="0">
+                <a:solidFill>
+                  <a:schemeClr val="tx1">
+                    <a:lumMod val="75000"/>
+                    <a:lumOff val="25000"/>
+                  </a:schemeClr>
+                </a:solidFill>
+              </a:rPr>
+              <a:t>Radio1.ItemGroup</a:t>
+            </a:r>
+            <a:r>
+              <a:rPr kumimoji="1" lang="ko-KR" altLang="en-US" sz="700" dirty="0">
+                <a:solidFill>
+                  <a:schemeClr val="tx1">
+                    <a:lumMod val="75000"/>
+                    <a:lumOff val="25000"/>
+                  </a:schemeClr>
+                </a:solidFill>
+              </a:rPr>
+              <a:t>은 </a:t>
+            </a:r>
+            <a:r>
+              <a:rPr kumimoji="1" lang="en-US" altLang="ko-KR" sz="700" dirty="0">
+                <a:solidFill>
+                  <a:schemeClr val="tx1">
+                    <a:lumMod val="75000"/>
+                    <a:lumOff val="25000"/>
+                  </a:schemeClr>
+                </a:solidFill>
+              </a:rPr>
+              <a:t>null</a:t>
+            </a:r>
+            <a:r>
+              <a:rPr kumimoji="1" lang="ko-KR" altLang="en-US" sz="700" dirty="0">
+                <a:solidFill>
+                  <a:schemeClr val="tx1">
+                    <a:lumMod val="75000"/>
+                    <a:lumOff val="25000"/>
+                  </a:schemeClr>
+                </a:solidFill>
+              </a:rPr>
+              <a:t>을 </a:t>
+            </a:r>
+            <a:r>
+              <a:rPr kumimoji="1" lang="ko-KR" altLang="en-US" sz="700" dirty="0" err="1">
+                <a:solidFill>
+                  <a:schemeClr val="tx1">
+                    <a:lumMod val="75000"/>
+                    <a:lumOff val="25000"/>
+                  </a:schemeClr>
+                </a:solidFill>
+              </a:rPr>
+              <a:t>리턴함</a:t>
+            </a:r>
+            <a:r>
+              <a:rPr kumimoji="1" lang="en-US" altLang="ko-KR" sz="700" dirty="0">
+                <a:solidFill>
+                  <a:schemeClr val="tx1">
+                    <a:lumMod val="75000"/>
+                    <a:lumOff val="25000"/>
+                  </a:schemeClr>
+                </a:solidFill>
+              </a:rPr>
+              <a:t>.</a:t>
+            </a:r>
+            <a:endParaRPr kumimoji="1" lang="ko-Kore-KR" altLang="en-US" sz="700" dirty="0">
+              <a:solidFill>
+                <a:schemeClr val="tx1">
+                  <a:lumMod val="75000"/>
+                  <a:lumOff val="25000"/>
+                </a:schemeClr>
+              </a:solidFill>
+            </a:endParaRPr>
+          </a:p>
+        </p:txBody>
+      </p:sp>
+      <p:sp>
+        <p:nvSpPr>
+          <p:cNvPr id="9" name="직사각형 8">
+            <a:extLst>
+              <a:ext uri="{FF2B5EF4-FFF2-40B4-BE49-F238E27FC236}">
+                <a16:creationId xmlns:a16="http://schemas.microsoft.com/office/drawing/2014/main" id="{185D5881-1641-7747-8C34-00097496B660}"/>
+              </a:ext>
+            </a:extLst>
+          </p:cNvPr>
+          <p:cNvSpPr/>
+          <p:nvPr/>
+        </p:nvSpPr>
+        <p:spPr>
+          <a:xfrm>
+            <a:off x="6809874" y="4093741"/>
+            <a:ext cx="4202429" cy="965147"/>
+          </a:xfrm>
+          <a:prstGeom prst="rect">
+            <a:avLst/>
+          </a:prstGeom>
+          <a:noFill/>
+          <a:ln w="28575">
+            <a:solidFill>
+              <a:srgbClr val="FFC000"/>
+            </a:solidFill>
+          </a:ln>
+        </p:spPr>
+        <p:style>
+          <a:lnRef idx="2">
+            <a:schemeClr val="accent1">
+              <a:shade val="50000"/>
+            </a:schemeClr>
+          </a:lnRef>
+          <a:fillRef idx="1">
+            <a:schemeClr val="accent1"/>
+          </a:fillRef>
+          <a:effectRef idx="0">
+            <a:schemeClr val="accent1"/>
+          </a:effectRef>
+          <a:fontRef idx="minor">
+            <a:schemeClr val="lt1"/>
+          </a:fontRef>
+        </p:style>
+        <p:txBody>
+          <a:bodyPr rtlCol="0" anchor="ctr"/>
+          <a:lstStyle/>
+          <a:p>
+            <a:pPr algn="ctr"/>
+            <a:endParaRPr kumimoji="1" lang="ko-Kore-KR" altLang="en-US"/>
+          </a:p>
+        </p:txBody>
+      </p:sp>
+      <p:sp>
+        <p:nvSpPr>
+          <p:cNvPr id="10" name="직사각형 9">
+            <a:extLst>
+              <a:ext uri="{FF2B5EF4-FFF2-40B4-BE49-F238E27FC236}">
+                <a16:creationId xmlns:a16="http://schemas.microsoft.com/office/drawing/2014/main" id="{138738E4-087C-3B4A-A950-CDDFBCF800E3}"/>
+              </a:ext>
+            </a:extLst>
+          </p:cNvPr>
+          <p:cNvSpPr/>
+          <p:nvPr/>
+        </p:nvSpPr>
+        <p:spPr>
+          <a:xfrm>
+            <a:off x="8998599" y="5058888"/>
+            <a:ext cx="2013704" cy="642026"/>
+          </a:xfrm>
+          <a:prstGeom prst="rect">
+            <a:avLst/>
+          </a:prstGeom>
+          <a:solidFill>
+            <a:srgbClr val="FFC000"/>
+          </a:solidFill>
+          <a:ln w="28575">
+            <a:solidFill>
+              <a:srgbClr val="FFC000"/>
+            </a:solidFill>
+          </a:ln>
+        </p:spPr>
+        <p:style>
+          <a:lnRef idx="2">
+            <a:schemeClr val="accent1">
+              <a:shade val="50000"/>
+            </a:schemeClr>
+          </a:lnRef>
+          <a:fillRef idx="1">
+            <a:schemeClr val="accent1"/>
+          </a:fillRef>
+          <a:effectRef idx="0">
+            <a:schemeClr val="accent1"/>
+          </a:effectRef>
+          <a:fontRef idx="minor">
+            <a:schemeClr val="lt1"/>
+          </a:fontRef>
+        </p:style>
+        <p:txBody>
+          <a:bodyPr rtlCol="0" anchor="t"/>
+          <a:lstStyle/>
+          <a:p>
+            <a:r>
+              <a:rPr kumimoji="1" lang="en-US" altLang="ko-KR" sz="700" dirty="0">
+                <a:solidFill>
+                  <a:schemeClr val="tx1">
+                    <a:lumMod val="75000"/>
+                    <a:lumOff val="25000"/>
+                  </a:schemeClr>
+                </a:solidFill>
+              </a:rPr>
+              <a:t>(3)</a:t>
+            </a:r>
+            <a:r>
+              <a:rPr kumimoji="1" lang="ko-KR" altLang="en-US" sz="700" dirty="0">
+                <a:solidFill>
+                  <a:schemeClr val="tx1">
+                    <a:lumMod val="75000"/>
+                    <a:lumOff val="25000"/>
+                  </a:schemeClr>
+                </a:solidFill>
+              </a:rPr>
+              <a:t> </a:t>
+            </a:r>
+            <a:r>
+              <a:rPr kumimoji="1" lang="en-US" altLang="ko-KR" sz="700" dirty="0" err="1">
+                <a:solidFill>
+                  <a:schemeClr val="tx1">
+                    <a:lumMod val="75000"/>
+                    <a:lumOff val="25000"/>
+                  </a:schemeClr>
+                </a:solidFill>
+              </a:rPr>
+              <a:t>OnRadioGroupChanged</a:t>
+            </a:r>
+            <a:r>
+              <a:rPr kumimoji="1" lang="en-US" altLang="ko-KR" sz="700" dirty="0">
+                <a:solidFill>
+                  <a:schemeClr val="tx1">
+                    <a:lumMod val="75000"/>
+                    <a:lumOff val="25000"/>
+                  </a:schemeClr>
+                </a:solidFill>
+              </a:rPr>
+              <a:t> </a:t>
+            </a:r>
+            <a:r>
+              <a:rPr kumimoji="1" lang="ko-KR" altLang="en-US" sz="700" dirty="0" err="1">
+                <a:solidFill>
+                  <a:schemeClr val="tx1">
+                    <a:lumMod val="75000"/>
+                    <a:lumOff val="25000"/>
+                  </a:schemeClr>
+                </a:solidFill>
+              </a:rPr>
+              <a:t>메소드</a:t>
+            </a:r>
+            <a:r>
+              <a:rPr kumimoji="1" lang="ko-KR" altLang="en-US" sz="700" dirty="0">
+                <a:solidFill>
+                  <a:schemeClr val="tx1">
+                    <a:lumMod val="75000"/>
+                    <a:lumOff val="25000"/>
+                  </a:schemeClr>
+                </a:solidFill>
+              </a:rPr>
+              <a:t> 정의 및 구현</a:t>
+            </a:r>
+            <a:endParaRPr kumimoji="1" lang="en-US" altLang="ko-KR" sz="700" dirty="0">
+              <a:solidFill>
+                <a:schemeClr val="tx1">
+                  <a:lumMod val="75000"/>
+                  <a:lumOff val="25000"/>
+                </a:schemeClr>
+              </a:solidFill>
+            </a:endParaRPr>
+          </a:p>
+          <a:p>
+            <a:endParaRPr kumimoji="1" lang="en-US" altLang="ko-KR" sz="700" dirty="0">
+              <a:solidFill>
+                <a:schemeClr val="tx1">
+                  <a:lumMod val="75000"/>
+                  <a:lumOff val="25000"/>
+                </a:schemeClr>
+              </a:solidFill>
+            </a:endParaRPr>
+          </a:p>
+          <a:p>
+            <a:r>
+              <a:rPr kumimoji="1" lang="ko-KR" altLang="en-US" sz="700" dirty="0">
+                <a:solidFill>
+                  <a:schemeClr val="tx1">
+                    <a:lumMod val="75000"/>
+                    <a:lumOff val="25000"/>
+                  </a:schemeClr>
+                </a:solidFill>
+              </a:rPr>
+              <a:t>* 그룹의 </a:t>
+            </a:r>
+            <a:r>
+              <a:rPr kumimoji="1" lang="en-US" altLang="ko-KR" sz="700" dirty="0">
+                <a:solidFill>
+                  <a:schemeClr val="tx1">
+                    <a:lumMod val="75000"/>
+                    <a:lumOff val="25000"/>
+                  </a:schemeClr>
+                </a:solidFill>
+              </a:rPr>
+              <a:t>selection</a:t>
+            </a:r>
+            <a:r>
+              <a:rPr kumimoji="1" lang="ko-KR" altLang="en-US" sz="700" dirty="0">
+                <a:solidFill>
+                  <a:schemeClr val="tx1">
+                    <a:lumMod val="75000"/>
+                    <a:lumOff val="25000"/>
+                  </a:schemeClr>
+                </a:solidFill>
+              </a:rPr>
+              <a:t>이 </a:t>
+            </a:r>
+            <a:r>
+              <a:rPr kumimoji="1" lang="ko-KR" altLang="en-US" sz="700" dirty="0" err="1">
+                <a:solidFill>
+                  <a:schemeClr val="tx1">
+                    <a:lumMod val="75000"/>
+                    <a:lumOff val="25000"/>
+                  </a:schemeClr>
+                </a:solidFill>
+              </a:rPr>
+              <a:t>바뀔때마다</a:t>
+            </a:r>
+            <a:r>
+              <a:rPr kumimoji="1" lang="ko-KR" altLang="en-US" sz="700" dirty="0">
+                <a:solidFill>
+                  <a:schemeClr val="tx1">
+                    <a:lumMod val="75000"/>
+                    <a:lumOff val="25000"/>
+                  </a:schemeClr>
+                </a:solidFill>
+              </a:rPr>
+              <a:t> 호출됨</a:t>
+            </a:r>
+            <a:r>
+              <a:rPr kumimoji="1" lang="en-US" altLang="ko-KR" sz="700" dirty="0">
+                <a:solidFill>
+                  <a:schemeClr val="tx1">
+                    <a:lumMod val="75000"/>
+                    <a:lumOff val="25000"/>
+                  </a:schemeClr>
+                </a:solidFill>
+              </a:rPr>
+              <a:t>.</a:t>
+            </a:r>
+          </a:p>
+          <a:p>
+            <a:r>
+              <a:rPr kumimoji="1" lang="ko-KR" altLang="en-US" sz="700" dirty="0">
+                <a:solidFill>
+                  <a:schemeClr val="tx1">
+                    <a:lumMod val="75000"/>
+                    <a:lumOff val="25000"/>
+                  </a:schemeClr>
+                </a:solidFill>
+              </a:rPr>
+              <a:t>* </a:t>
+            </a:r>
+            <a:r>
+              <a:rPr kumimoji="1" lang="ko-KR" altLang="en-US" sz="700" dirty="0" err="1">
+                <a:solidFill>
+                  <a:schemeClr val="tx1">
+                    <a:lumMod val="75000"/>
+                    <a:lumOff val="25000"/>
+                  </a:schemeClr>
+                </a:solidFill>
+              </a:rPr>
+              <a:t>호출될때마다</a:t>
+            </a:r>
+            <a:r>
+              <a:rPr kumimoji="1" lang="ko-KR" altLang="en-US" sz="700" dirty="0">
+                <a:solidFill>
+                  <a:schemeClr val="tx1">
+                    <a:lumMod val="75000"/>
+                    <a:lumOff val="25000"/>
+                  </a:schemeClr>
+                </a:solidFill>
+              </a:rPr>
+              <a:t> 상태를 </a:t>
+            </a:r>
+            <a:r>
+              <a:rPr kumimoji="1" lang="en-US" altLang="ko-KR" sz="700" dirty="0" err="1">
+                <a:solidFill>
+                  <a:schemeClr val="tx1">
+                    <a:lumMod val="75000"/>
+                    <a:lumOff val="25000"/>
+                  </a:schemeClr>
+                </a:solidFill>
+              </a:rPr>
+              <a:t>OutputText</a:t>
+            </a:r>
+            <a:r>
+              <a:rPr kumimoji="1" lang="ko-KR" altLang="en-US" sz="700" dirty="0">
+                <a:solidFill>
+                  <a:schemeClr val="tx1">
+                    <a:lumMod val="75000"/>
+                    <a:lumOff val="25000"/>
+                  </a:schemeClr>
+                </a:solidFill>
+              </a:rPr>
+              <a:t>에 업데이트</a:t>
+            </a:r>
+            <a:endParaRPr kumimoji="1" lang="ko-Kore-KR" altLang="en-US" sz="700" dirty="0">
+              <a:solidFill>
+                <a:schemeClr val="tx1">
+                  <a:lumMod val="75000"/>
+                  <a:lumOff val="25000"/>
+                </a:schemeClr>
+              </a:solidFill>
+            </a:endParaRPr>
+          </a:p>
+        </p:txBody>
+      </p:sp>
+    </p:spTree>
+    <p:extLst>
+      <p:ext uri="{BB962C8B-B14F-4D97-AF65-F5344CB8AC3E}">
+        <p14:creationId xmlns:p14="http://schemas.microsoft.com/office/powerpoint/2010/main" val="1044156602"/>
+      </p:ext>
+    </p:extLst>
+  </p:cSld>
+  <p:clrMapOvr>
+    <a:masterClrMapping/>
+  </p:clrMapOvr>
+</p:sld>
+</file>
+
+<file path=ppt/slides/slide12.xml><?xml version="1.0" encoding="utf-8"?>
+<p:sld xmlns:a="http://schemas.openxmlformats.org/drawingml/2006/main" xmlns:r="http://schemas.openxmlformats.org/officeDocument/2006/relationships" xmlns:p="http://schemas.openxmlformats.org/presentationml/2006/main">
+  <p:cSld>
+    <p:spTree>
+      <p:nvGrpSpPr>
+        <p:cNvPr id="1" name=""/>
+        <p:cNvGrpSpPr/>
+        <p:nvPr/>
+      </p:nvGrpSpPr>
+      <p:grpSpPr>
+        <a:xfrm>
+          <a:off x="0" y="0"/>
+          <a:ext cx="0" cy="0"/>
+          <a:chOff x="0" y="0"/>
+          <a:chExt cx="0" cy="0"/>
+        </a:xfrm>
+      </p:grpSpPr>
       <p:pic>
         <p:nvPicPr>
           <p:cNvPr id="9" name="그림 8">
@@ -4244,7 +5621,7 @@
 </p:sld>
 </file>
 
-<file path=ppt/slides/slide11.xml><?xml version="1.0" encoding="utf-8"?>
+<file path=ppt/slides/slide13.xml><?xml version="1.0" encoding="utf-8"?>
 <p:sld xmlns:a="http://schemas.openxmlformats.org/drawingml/2006/main" xmlns:r="http://schemas.openxmlformats.org/officeDocument/2006/relationships" xmlns:p="http://schemas.openxmlformats.org/presentationml/2006/main">
   <p:cSld>
     <p:spTree>
@@ -4373,7 +5750,7 @@
 </p:sld>
 </file>
 
-<file path=ppt/slides/slide12.xml><?xml version="1.0" encoding="utf-8"?>
+<file path=ppt/slides/slide14.xml><?xml version="1.0" encoding="utf-8"?>
 <p:sld xmlns:a="http://schemas.openxmlformats.org/drawingml/2006/main" xmlns:r="http://schemas.openxmlformats.org/officeDocument/2006/relationships" xmlns:p="http://schemas.openxmlformats.org/presentationml/2006/main">
   <p:cSld>
     <p:spTree>
@@ -5279,7 +6656,7 @@
 </p:sld>
 </file>
 
-<file path=ppt/slides/slide13.xml><?xml version="1.0" encoding="utf-8"?>
+<file path=ppt/slides/slide15.xml><?xml version="1.0" encoding="utf-8"?>
 <p:sld xmlns:a="http://schemas.openxmlformats.org/drawingml/2006/main" xmlns:r="http://schemas.openxmlformats.org/officeDocument/2006/relationships" xmlns:p="http://schemas.openxmlformats.org/presentationml/2006/main">
   <p:cSld>
     <p:spTree>
@@ -5626,7 +7003,7 @@
         </p:nvSpPr>
         <p:spPr>
           <a:xfrm>
-            <a:off x="6487" y="1977957"/>
+            <a:off x="6487" y="1429320"/>
             <a:ext cx="12192000" cy="1815882"/>
           </a:xfrm>
           <a:prstGeom prst="rect">
@@ -5642,19 +7019,24 @@
           <a:p>
             <a:pPr algn="ctr"/>
             <a:r>
-              <a:rPr kumimoji="1" lang="en-US" altLang="ko-Kore-KR" sz="7200" dirty="0"/>
-              <a:t>Button</a:t>
-            </a:r>
+              <a:rPr kumimoji="1" lang="ko-KR" altLang="en-US" sz="7200" dirty="0"/>
+              <a:t>기본화면구성</a:t>
+            </a:r>
+            <a:endParaRPr kumimoji="1" lang="en-US" altLang="ko-Kore-KR" sz="7200" dirty="0"/>
           </a:p>
           <a:p>
             <a:pPr algn="ctr"/>
             <a:r>
-              <a:rPr kumimoji="1" lang="ko-Kore-KR" altLang="en-US" sz="2000" dirty="0"/>
-              <a:t>가장</a:t>
-            </a:r>
-            <a:r>
               <a:rPr kumimoji="1" lang="ko-KR" altLang="en-US" sz="2000" dirty="0"/>
-              <a:t> 기본이 되는 컴포넌트로</a:t>
+              <a:t>앱을 좌우로 </a:t>
+            </a:r>
+            <a:r>
+              <a:rPr kumimoji="1" lang="en-US" altLang="ko-KR" sz="2000" dirty="0"/>
+              <a:t>2</a:t>
+            </a:r>
+            <a:r>
+              <a:rPr kumimoji="1" lang="ko-KR" altLang="en-US" sz="2000" dirty="0"/>
+              <a:t>등분하여</a:t>
             </a:r>
             <a:endParaRPr kumimoji="1" lang="en-US" altLang="ko-KR" sz="2000" dirty="0"/>
           </a:p>
@@ -5662,20 +7044,202 @@
             <a:pPr algn="ctr"/>
             <a:r>
               <a:rPr kumimoji="1" lang="ko-KR" altLang="en-US" sz="2000" dirty="0"/>
-              <a:t>클릭 이벤트를 제공하는 것이 특징입니다</a:t>
+              <a:t>컴포넌트 영역과 결과표시 영역으로 나눠봅니다</a:t>
             </a:r>
             <a:r>
               <a:rPr kumimoji="1" lang="en-US" altLang="ko-KR" sz="2000" dirty="0"/>
               <a:t>.</a:t>
             </a:r>
+            <a:r>
+              <a:rPr kumimoji="1" lang="ko-KR" altLang="en-US" sz="2000" dirty="0"/>
+              <a:t> </a:t>
+            </a:r>
             <a:endParaRPr kumimoji="1" lang="ko-Kore-KR" altLang="en-US" sz="2000" dirty="0"/>
+          </a:p>
+        </p:txBody>
+      </p:sp>
+      <p:pic>
+        <p:nvPicPr>
+          <p:cNvPr id="3" name="그림 2">
+            <a:extLst>
+              <a:ext uri="{FF2B5EF4-FFF2-40B4-BE49-F238E27FC236}">
+                <a16:creationId xmlns:a16="http://schemas.microsoft.com/office/drawing/2014/main" id="{FD867E9D-827C-6C4E-8A8B-159F0582A7C2}"/>
+              </a:ext>
+            </a:extLst>
+          </p:cNvPr>
+          <p:cNvPicPr>
+            <a:picLocks noChangeAspect="1"/>
+          </p:cNvPicPr>
+          <p:nvPr/>
+        </p:nvPicPr>
+        <p:blipFill rotWithShape="1">
+          <a:blip r:embed="rId2"/>
+          <a:srcRect l="-1" r="-12" b="38971"/>
+          <a:stretch/>
+        </p:blipFill>
+        <p:spPr>
+          <a:xfrm>
+            <a:off x="2703019" y="3429000"/>
+            <a:ext cx="7473368" cy="2636454"/>
+          </a:xfrm>
+          <a:prstGeom prst="rect">
+            <a:avLst/>
+          </a:prstGeom>
+          <a:ln w="3175">
+            <a:solidFill>
+              <a:schemeClr val="bg2">
+                <a:lumMod val="50000"/>
+              </a:schemeClr>
+            </a:solidFill>
+          </a:ln>
+        </p:spPr>
+      </p:pic>
+      <p:sp>
+        <p:nvSpPr>
+          <p:cNvPr id="5" name="직사각형 4">
+            <a:extLst>
+              <a:ext uri="{FF2B5EF4-FFF2-40B4-BE49-F238E27FC236}">
+                <a16:creationId xmlns:a16="http://schemas.microsoft.com/office/drawing/2014/main" id="{2E75AF76-6E05-F340-9BD6-DB560607661A}"/>
+              </a:ext>
+            </a:extLst>
+          </p:cNvPr>
+          <p:cNvSpPr/>
+          <p:nvPr/>
+        </p:nvSpPr>
+        <p:spPr>
+          <a:xfrm>
+            <a:off x="3955790" y="5894028"/>
+            <a:ext cx="1046864" cy="342852"/>
+          </a:xfrm>
+          <a:prstGeom prst="rect">
+            <a:avLst/>
+          </a:prstGeom>
+          <a:solidFill>
+            <a:srgbClr val="FFC000"/>
+          </a:solidFill>
+          <a:ln w="28575">
+            <a:solidFill>
+              <a:srgbClr val="FFC000"/>
+            </a:solidFill>
+          </a:ln>
+        </p:spPr>
+        <p:style>
+          <a:lnRef idx="2">
+            <a:schemeClr val="accent1">
+              <a:shade val="50000"/>
+            </a:schemeClr>
+          </a:lnRef>
+          <a:fillRef idx="1">
+            <a:schemeClr val="accent1"/>
+          </a:fillRef>
+          <a:effectRef idx="0">
+            <a:schemeClr val="accent1"/>
+          </a:effectRef>
+          <a:fontRef idx="minor">
+            <a:schemeClr val="lt1"/>
+          </a:fontRef>
+        </p:style>
+        <p:txBody>
+          <a:bodyPr rtlCol="0" anchor="t"/>
+          <a:lstStyle/>
+          <a:p>
+            <a:r>
+              <a:rPr kumimoji="1" lang="ko-KR" altLang="en-US" sz="700" dirty="0">
+                <a:solidFill>
+                  <a:schemeClr val="tx1">
+                    <a:lumMod val="75000"/>
+                    <a:lumOff val="25000"/>
+                  </a:schemeClr>
+                </a:solidFill>
+              </a:rPr>
+              <a:t>컴포넌트 영역</a:t>
+            </a:r>
+            <a:endParaRPr kumimoji="1" lang="en-US" altLang="ko-KR" sz="700" dirty="0">
+              <a:solidFill>
+                <a:schemeClr val="tx1">
+                  <a:lumMod val="75000"/>
+                  <a:lumOff val="25000"/>
+                </a:schemeClr>
+              </a:solidFill>
+            </a:endParaRPr>
+          </a:p>
+        </p:txBody>
+      </p:sp>
+      <p:sp>
+        <p:nvSpPr>
+          <p:cNvPr id="6" name="직사각형 5">
+            <a:extLst>
+              <a:ext uri="{FF2B5EF4-FFF2-40B4-BE49-F238E27FC236}">
+                <a16:creationId xmlns:a16="http://schemas.microsoft.com/office/drawing/2014/main" id="{CCB8F4D8-A28D-C345-A418-4F778A265E31}"/>
+              </a:ext>
+            </a:extLst>
+          </p:cNvPr>
+          <p:cNvSpPr/>
+          <p:nvPr/>
+        </p:nvSpPr>
+        <p:spPr>
+          <a:xfrm>
+            <a:off x="7783488" y="5931259"/>
+            <a:ext cx="1046864" cy="342852"/>
+          </a:xfrm>
+          <a:prstGeom prst="rect">
+            <a:avLst/>
+          </a:prstGeom>
+          <a:solidFill>
+            <a:srgbClr val="FFC000"/>
+          </a:solidFill>
+          <a:ln w="28575">
+            <a:solidFill>
+              <a:srgbClr val="FFC000"/>
+            </a:solidFill>
+          </a:ln>
+        </p:spPr>
+        <p:style>
+          <a:lnRef idx="2">
+            <a:schemeClr val="accent1">
+              <a:shade val="50000"/>
+            </a:schemeClr>
+          </a:lnRef>
+          <a:fillRef idx="1">
+            <a:schemeClr val="accent1"/>
+          </a:fillRef>
+          <a:effectRef idx="0">
+            <a:schemeClr val="accent1"/>
+          </a:effectRef>
+          <a:fontRef idx="minor">
+            <a:schemeClr val="lt1"/>
+          </a:fontRef>
+        </p:style>
+        <p:txBody>
+          <a:bodyPr rtlCol="0" anchor="t"/>
+          <a:lstStyle/>
+          <a:p>
+            <a:r>
+              <a:rPr kumimoji="1" lang="ko-KR" altLang="en-US" sz="700" dirty="0">
+                <a:solidFill>
+                  <a:schemeClr val="tx1">
+                    <a:lumMod val="75000"/>
+                    <a:lumOff val="25000"/>
+                  </a:schemeClr>
+                </a:solidFill>
+              </a:rPr>
+              <a:t>결과 표시 영역</a:t>
+            </a:r>
+            <a:endParaRPr kumimoji="1" lang="en-US" altLang="ko-KR" sz="700" dirty="0">
+              <a:solidFill>
+                <a:schemeClr val="tx1">
+                  <a:lumMod val="75000"/>
+                  <a:lumOff val="25000"/>
+                </a:schemeClr>
+              </a:solidFill>
+            </a:endParaRPr>
           </a:p>
         </p:txBody>
       </p:sp>
     </p:spTree>
     <p:extLst>
       <p:ext uri="{BB962C8B-B14F-4D97-AF65-F5344CB8AC3E}">
-        <p14:creationId xmlns:p14="http://schemas.microsoft.com/office/powerpoint/2010/main" val="789444832"/>
+        <p14:creationId xmlns:p14="http://schemas.microsoft.com/office/powerpoint/2010/main" val="1970581799"/>
       </p:ext>
     </p:extLst>
   </p:cSld>
@@ -5798,8 +7362,8 @@
         </p:nvSpPr>
         <p:spPr>
           <a:xfrm>
-            <a:off x="4317694" y="3413496"/>
-            <a:ext cx="1274324" cy="359923"/>
+            <a:off x="4317693" y="3413495"/>
+            <a:ext cx="1666083" cy="2067005"/>
           </a:xfrm>
           <a:prstGeom prst="rect">
             <a:avLst/>
@@ -5842,19 +7406,153 @@
                   </a:schemeClr>
                 </a:solidFill>
               </a:rPr>
-              <a:t>(2)</a:t>
-            </a:r>
-            <a:r>
-              <a:rPr kumimoji="1" lang="ko-KR" altLang="en-US" sz="700" dirty="0">
-                <a:solidFill>
-                  <a:schemeClr val="tx1">
-                    <a:lumMod val="75000"/>
-                    <a:lumOff val="25000"/>
-                  </a:schemeClr>
-                </a:solidFill>
-              </a:rPr>
-              <a:t> </a:t>
-            </a:r>
+              <a:t>(3)</a:t>
+            </a:r>
+            <a:r>
+              <a:rPr kumimoji="1" lang="ko-KR" altLang="en-US" sz="700" dirty="0">
+                <a:solidFill>
+                  <a:schemeClr val="tx1">
+                    <a:lumMod val="75000"/>
+                    <a:lumOff val="25000"/>
+                  </a:schemeClr>
+                </a:solidFill>
+              </a:rPr>
+              <a:t> 남은 </a:t>
+            </a:r>
+            <a:r>
+              <a:rPr kumimoji="1" lang="en-US" altLang="ko-KR" sz="700" dirty="0">
+                <a:solidFill>
+                  <a:schemeClr val="tx1">
+                    <a:lumMod val="75000"/>
+                    <a:lumOff val="25000"/>
+                  </a:schemeClr>
+                </a:solidFill>
+              </a:rPr>
+              <a:t>50%</a:t>
+            </a:r>
+            <a:r>
+              <a:rPr kumimoji="1" lang="ko-KR" altLang="en-US" sz="700" dirty="0">
+                <a:solidFill>
+                  <a:schemeClr val="tx1">
+                    <a:lumMod val="75000"/>
+                    <a:lumOff val="25000"/>
+                  </a:schemeClr>
+                </a:solidFill>
+              </a:rPr>
+              <a:t>를 차지하는 </a:t>
+            </a:r>
+            <a:r>
+              <a:rPr kumimoji="1" lang="en-US" altLang="ko-KR" sz="700" dirty="0">
+                <a:solidFill>
+                  <a:schemeClr val="tx1">
+                    <a:lumMod val="75000"/>
+                    <a:lumOff val="25000"/>
+                  </a:schemeClr>
+                </a:solidFill>
+              </a:rPr>
+              <a:t>TextEditor</a:t>
+            </a:r>
+            <a:r>
+              <a:rPr kumimoji="1" lang="ko-KR" altLang="en-US" sz="700" dirty="0">
+                <a:solidFill>
+                  <a:schemeClr val="tx1">
+                    <a:lumMod val="75000"/>
+                    <a:lumOff val="25000"/>
+                  </a:schemeClr>
+                </a:solidFill>
+              </a:rPr>
+              <a:t> 를 만듭니다</a:t>
+            </a:r>
+            <a:r>
+              <a:rPr kumimoji="1" lang="en-US" altLang="ko-KR" sz="700" dirty="0">
+                <a:solidFill>
+                  <a:schemeClr val="tx1">
+                    <a:lumMod val="75000"/>
+                    <a:lumOff val="25000"/>
+                  </a:schemeClr>
+                </a:solidFill>
+              </a:rPr>
+              <a:t>.</a:t>
+            </a:r>
+          </a:p>
+          <a:p>
+            <a:endParaRPr kumimoji="1" lang="en-US" altLang="ko-KR" sz="700" dirty="0">
+              <a:solidFill>
+                <a:schemeClr val="tx1">
+                  <a:lumMod val="75000"/>
+                  <a:lumOff val="25000"/>
+                </a:schemeClr>
+              </a:solidFill>
+            </a:endParaRPr>
+          </a:p>
+          <a:p>
+            <a:r>
+              <a:rPr kumimoji="1" lang="en-US" altLang="ko-KR" sz="700" dirty="0">
+                <a:solidFill>
+                  <a:schemeClr val="tx1">
+                    <a:lumMod val="75000"/>
+                    <a:lumOff val="25000"/>
+                  </a:schemeClr>
+                </a:solidFill>
+              </a:rPr>
+              <a:t>X:Name</a:t>
+            </a:r>
+            <a:r>
+              <a:rPr kumimoji="1" lang="ko-KR" altLang="en-US" sz="700" dirty="0">
+                <a:solidFill>
+                  <a:schemeClr val="tx1">
+                    <a:lumMod val="75000"/>
+                    <a:lumOff val="25000"/>
+                  </a:schemeClr>
+                </a:solidFill>
+              </a:rPr>
+              <a:t>을 지정하여 </a:t>
+            </a:r>
+            <a:r>
+              <a:rPr kumimoji="1" lang="en-US" altLang="ko-KR" sz="700" dirty="0">
+                <a:solidFill>
+                  <a:schemeClr val="tx1">
+                    <a:lumMod val="75000"/>
+                    <a:lumOff val="25000"/>
+                  </a:schemeClr>
+                </a:solidFill>
+              </a:rPr>
+              <a:t>cs </a:t>
+            </a:r>
+            <a:r>
+              <a:rPr kumimoji="1" lang="ko-KR" altLang="en-US" sz="700" dirty="0">
+                <a:solidFill>
+                  <a:schemeClr val="tx1">
+                    <a:lumMod val="75000"/>
+                    <a:lumOff val="25000"/>
+                  </a:schemeClr>
+                </a:solidFill>
+              </a:rPr>
+              <a:t>파일에서 접근하기 용이하게 합니다</a:t>
+            </a:r>
+            <a:r>
+              <a:rPr kumimoji="1" lang="en-US" altLang="ko-KR" sz="700" dirty="0">
+                <a:solidFill>
+                  <a:schemeClr val="tx1">
+                    <a:lumMod val="75000"/>
+                    <a:lumOff val="25000"/>
+                  </a:schemeClr>
+                </a:solidFill>
+              </a:rPr>
+              <a:t>.</a:t>
+            </a:r>
+          </a:p>
+          <a:p>
+            <a:endParaRPr kumimoji="1" lang="en-US" altLang="ko-Kore-KR" sz="700" dirty="0">
+              <a:solidFill>
+                <a:schemeClr val="tx1">
+                  <a:lumMod val="75000"/>
+                  <a:lumOff val="25000"/>
+                </a:schemeClr>
+              </a:solidFill>
+            </a:endParaRPr>
+          </a:p>
+          <a:p>
             <a:r>
               <a:rPr kumimoji="1" lang="ko-Kore-KR" altLang="en-US" sz="700" dirty="0">
                 <a:solidFill>
@@ -5864,18 +7562,39 @@
                   </a:schemeClr>
                 </a:solidFill>
               </a:rPr>
-              <a:t>버튼</a:t>
-            </a:r>
-            <a:r>
-              <a:rPr kumimoji="1" lang="ko-KR" altLang="en-US" sz="700" dirty="0">
-                <a:solidFill>
-                  <a:schemeClr val="tx1">
-                    <a:lumMod val="75000"/>
-                    <a:lumOff val="25000"/>
-                  </a:schemeClr>
-                </a:solidFill>
-              </a:rPr>
-              <a:t> 클릭 결과를 표시할 </a:t>
+              <a:t>컴포넌트들을</a:t>
+            </a:r>
+            <a:r>
+              <a:rPr kumimoji="1" lang="ko-KR" altLang="en-US" sz="700" dirty="0">
+                <a:solidFill>
+                  <a:schemeClr val="tx1">
+                    <a:lumMod val="75000"/>
+                    <a:lumOff val="25000"/>
+                  </a:schemeClr>
+                </a:solidFill>
+              </a:rPr>
+              <a:t> 조작할때마다</a:t>
+            </a:r>
+            <a:endParaRPr kumimoji="1" lang="en-US" altLang="ko-KR" sz="700" dirty="0">
+              <a:solidFill>
+                <a:schemeClr val="tx1">
+                  <a:lumMod val="75000"/>
+                  <a:lumOff val="25000"/>
+                </a:schemeClr>
+              </a:solidFill>
+            </a:endParaRPr>
+          </a:p>
+          <a:p>
+            <a:r>
+              <a:rPr kumimoji="1" lang="ko-KR" altLang="en-US" sz="700" dirty="0">
+                <a:solidFill>
+                  <a:schemeClr val="tx1">
+                    <a:lumMod val="75000"/>
+                    <a:lumOff val="25000"/>
+                  </a:schemeClr>
+                </a:solidFill>
+              </a:rPr>
+              <a:t>텍스트로 결과가 업데이트 될 영역입니다</a:t>
             </a:r>
             <a:r>
               <a:rPr kumimoji="1" lang="en-US" altLang="ko-KR" sz="700" dirty="0">
@@ -5886,18 +7605,184 @@
                   </a:schemeClr>
                 </a:solidFill>
               </a:rPr>
-              <a:t>text editor </a:t>
-            </a:r>
-            <a:r>
-              <a:rPr kumimoji="1" lang="ko-KR" altLang="en-US" sz="700" dirty="0">
-                <a:solidFill>
-                  <a:schemeClr val="tx1">
-                    <a:lumMod val="75000"/>
-                    <a:lumOff val="25000"/>
-                  </a:schemeClr>
-                </a:solidFill>
-              </a:rPr>
-              <a:t>배치</a:t>
+              <a:t>.</a:t>
+            </a:r>
+          </a:p>
+          <a:p>
+            <a:endParaRPr kumimoji="1" lang="en-US" altLang="ko-KR" sz="700" dirty="0">
+              <a:solidFill>
+                <a:schemeClr val="tx1">
+                  <a:lumMod val="75000"/>
+                  <a:lumOff val="25000"/>
+                </a:schemeClr>
+              </a:solidFill>
+            </a:endParaRPr>
+          </a:p>
+          <a:p>
+            <a:r>
+              <a:rPr kumimoji="1" lang="ko-KR" altLang="en-US" sz="700" dirty="0">
+                <a:solidFill>
+                  <a:schemeClr val="tx1">
+                    <a:lumMod val="75000"/>
+                    <a:lumOff val="25000"/>
+                  </a:schemeClr>
+                </a:solidFill>
+              </a:rPr>
+              <a:t>* </a:t>
+            </a:r>
+            <a:r>
+              <a:rPr kumimoji="1" lang="en-US" altLang="ko-KR" sz="700" dirty="0">
+                <a:solidFill>
+                  <a:schemeClr val="tx1">
+                    <a:lumMod val="75000"/>
+                    <a:lumOff val="25000"/>
+                  </a:schemeClr>
+                </a:solidFill>
+              </a:rPr>
+              <a:t>EnableEditing</a:t>
+            </a:r>
+            <a:r>
+              <a:rPr kumimoji="1" lang="ko-KR" altLang="en-US" sz="700" dirty="0">
+                <a:solidFill>
+                  <a:schemeClr val="tx1">
+                    <a:lumMod val="75000"/>
+                    <a:lumOff val="25000"/>
+                  </a:schemeClr>
+                </a:solidFill>
+              </a:rPr>
+              <a:t>을 </a:t>
+            </a:r>
+            <a:r>
+              <a:rPr kumimoji="1" lang="en-US" altLang="ko-KR" sz="700" dirty="0">
+                <a:solidFill>
+                  <a:schemeClr val="tx1">
+                    <a:lumMod val="75000"/>
+                    <a:lumOff val="25000"/>
+                  </a:schemeClr>
+                </a:solidFill>
+              </a:rPr>
+              <a:t>False</a:t>
+            </a:r>
+            <a:r>
+              <a:rPr kumimoji="1" lang="ko-KR" altLang="en-US" sz="700" dirty="0">
+                <a:solidFill>
+                  <a:schemeClr val="tx1">
+                    <a:lumMod val="75000"/>
+                    <a:lumOff val="25000"/>
+                  </a:schemeClr>
+                </a:solidFill>
+              </a:rPr>
+              <a:t> 로 설정하여</a:t>
+            </a:r>
+            <a:endParaRPr kumimoji="1" lang="en-US" altLang="ko-KR" sz="700" dirty="0">
+              <a:solidFill>
+                <a:schemeClr val="tx1">
+                  <a:lumMod val="75000"/>
+                  <a:lumOff val="25000"/>
+                </a:schemeClr>
+              </a:solidFill>
+            </a:endParaRPr>
+          </a:p>
+          <a:p>
+            <a:r>
+              <a:rPr kumimoji="1" lang="ko-KR" altLang="en-US" sz="700" dirty="0">
+                <a:solidFill>
+                  <a:schemeClr val="tx1">
+                    <a:lumMod val="75000"/>
+                    <a:lumOff val="25000"/>
+                  </a:schemeClr>
+                </a:solidFill>
+              </a:rPr>
+              <a:t>사용자가 편집하지 못하도록 합니다</a:t>
+            </a:r>
+            <a:r>
+              <a:rPr kumimoji="1" lang="en-US" altLang="ko-KR" sz="700" dirty="0">
+                <a:solidFill>
+                  <a:schemeClr val="tx1">
+                    <a:lumMod val="75000"/>
+                    <a:lumOff val="25000"/>
+                  </a:schemeClr>
+                </a:solidFill>
+              </a:rPr>
+              <a:t>.</a:t>
+            </a:r>
+          </a:p>
+          <a:p>
+            <a:endParaRPr kumimoji="1" lang="en-US" altLang="ko-Kore-KR" sz="700" dirty="0">
+              <a:solidFill>
+                <a:schemeClr val="tx1">
+                  <a:lumMod val="75000"/>
+                  <a:lumOff val="25000"/>
+                </a:schemeClr>
+              </a:solidFill>
+            </a:endParaRPr>
+          </a:p>
+          <a:p>
+            <a:r>
+              <a:rPr kumimoji="1" lang="ko-KR" altLang="en-US" sz="700" dirty="0">
+                <a:solidFill>
+                  <a:schemeClr val="tx1">
+                    <a:lumMod val="75000"/>
+                    <a:lumOff val="25000"/>
+                  </a:schemeClr>
+                </a:solidFill>
+              </a:rPr>
+              <a:t>* </a:t>
+            </a:r>
+            <a:r>
+              <a:rPr kumimoji="1" lang="en-US" altLang="ko-KR" sz="700" dirty="0">
+                <a:solidFill>
+                  <a:schemeClr val="tx1">
+                    <a:lumMod val="75000"/>
+                    <a:lumOff val="25000"/>
+                  </a:schemeClr>
+                </a:solidFill>
+              </a:rPr>
+              <a:t>PrimaryCursorPosition</a:t>
+            </a:r>
+            <a:r>
+              <a:rPr kumimoji="1" lang="ko-KR" altLang="en-US" sz="700" dirty="0">
+                <a:solidFill>
+                  <a:schemeClr val="tx1">
+                    <a:lumMod val="75000"/>
+                    <a:lumOff val="25000"/>
+                  </a:schemeClr>
+                </a:solidFill>
+              </a:rPr>
+              <a:t>에는 매우 큰값을 넣어주었는데</a:t>
+            </a:r>
+            <a:r>
+              <a:rPr kumimoji="1" lang="en-US" altLang="ko-KR" sz="700" dirty="0">
+                <a:solidFill>
+                  <a:schemeClr val="tx1">
+                    <a:lumMod val="75000"/>
+                    <a:lumOff val="25000"/>
+                  </a:schemeClr>
+                </a:solidFill>
+              </a:rPr>
+              <a:t>,</a:t>
+            </a:r>
+            <a:r>
+              <a:rPr kumimoji="1" lang="ko-KR" altLang="en-US" sz="700" dirty="0">
+                <a:solidFill>
+                  <a:schemeClr val="tx1">
+                    <a:lumMod val="75000"/>
+                    <a:lumOff val="25000"/>
+                  </a:schemeClr>
+                </a:solidFill>
+              </a:rPr>
+              <a:t> 이는 스크롤이 항상 제일 밑으로 가도록 하기 위함입니다</a:t>
+            </a:r>
+            <a:r>
+              <a:rPr kumimoji="1" lang="en-US" altLang="ko-KR" sz="700" dirty="0">
+                <a:solidFill>
+                  <a:schemeClr val="tx1">
+                    <a:lumMod val="75000"/>
+                    <a:lumOff val="25000"/>
+                  </a:schemeClr>
+                </a:solidFill>
+              </a:rPr>
+              <a:t>.</a:t>
             </a:r>
             <a:endParaRPr kumimoji="1" lang="ko-Kore-KR" altLang="en-US" sz="700" dirty="0">
               <a:solidFill>
@@ -5910,6 +7795,752 @@
           </a:p>
         </p:txBody>
       </p:sp>
+      <p:sp>
+        <p:nvSpPr>
+          <p:cNvPr id="13" name="직사각형 12">
+            <a:extLst>
+              <a:ext uri="{FF2B5EF4-FFF2-40B4-BE49-F238E27FC236}">
+                <a16:creationId xmlns:a16="http://schemas.microsoft.com/office/drawing/2014/main" id="{9C5B90DE-5FF8-A042-8BEB-0B52E1BBDE69}"/>
+              </a:ext>
+            </a:extLst>
+          </p:cNvPr>
+          <p:cNvSpPr/>
+          <p:nvPr/>
+        </p:nvSpPr>
+        <p:spPr>
+          <a:xfrm>
+            <a:off x="746571" y="1109447"/>
+            <a:ext cx="3565862" cy="720000"/>
+          </a:xfrm>
+          <a:prstGeom prst="rect">
+            <a:avLst/>
+          </a:prstGeom>
+          <a:noFill/>
+          <a:ln w="19050">
+            <a:solidFill>
+              <a:srgbClr val="FFC000"/>
+            </a:solidFill>
+          </a:ln>
+        </p:spPr>
+        <p:style>
+          <a:lnRef idx="2">
+            <a:schemeClr val="accent1">
+              <a:shade val="50000"/>
+            </a:schemeClr>
+          </a:lnRef>
+          <a:fillRef idx="1">
+            <a:schemeClr val="accent1"/>
+          </a:fillRef>
+          <a:effectRef idx="0">
+            <a:schemeClr val="accent1"/>
+          </a:effectRef>
+          <a:fontRef idx="minor">
+            <a:schemeClr val="lt1"/>
+          </a:fontRef>
+        </p:style>
+        <p:txBody>
+          <a:bodyPr rtlCol="0" anchor="ctr"/>
+          <a:lstStyle/>
+          <a:p>
+            <a:pPr algn="ctr"/>
+            <a:endParaRPr kumimoji="1" lang="ko-Kore-KR" altLang="en-US"/>
+          </a:p>
+        </p:txBody>
+      </p:sp>
+      <p:sp>
+        <p:nvSpPr>
+          <p:cNvPr id="16" name="직사각형 15">
+            <a:extLst>
+              <a:ext uri="{FF2B5EF4-FFF2-40B4-BE49-F238E27FC236}">
+                <a16:creationId xmlns:a16="http://schemas.microsoft.com/office/drawing/2014/main" id="{9D7DAE36-B1E8-F342-BA1C-6906A86A714D}"/>
+              </a:ext>
+            </a:extLst>
+          </p:cNvPr>
+          <p:cNvSpPr/>
+          <p:nvPr/>
+        </p:nvSpPr>
+        <p:spPr>
+          <a:xfrm>
+            <a:off x="6832325" y="2273946"/>
+            <a:ext cx="3125786" cy="492851"/>
+          </a:xfrm>
+          <a:prstGeom prst="rect">
+            <a:avLst/>
+          </a:prstGeom>
+          <a:solidFill>
+            <a:srgbClr val="1E1E1E"/>
+          </a:solidFill>
+          <a:ln w="28575">
+            <a:noFill/>
+          </a:ln>
+        </p:spPr>
+        <p:style>
+          <a:lnRef idx="2">
+            <a:schemeClr val="accent1">
+              <a:shade val="50000"/>
+            </a:schemeClr>
+          </a:lnRef>
+          <a:fillRef idx="1">
+            <a:schemeClr val="accent1"/>
+          </a:fillRef>
+          <a:effectRef idx="0">
+            <a:schemeClr val="accent1"/>
+          </a:effectRef>
+          <a:fontRef idx="minor">
+            <a:schemeClr val="lt1"/>
+          </a:fontRef>
+        </p:style>
+        <p:txBody>
+          <a:bodyPr rtlCol="0" anchor="t"/>
+          <a:lstStyle/>
+          <a:p>
+            <a:endParaRPr kumimoji="1" lang="ko-Kore-KR" altLang="en-US" sz="700" dirty="0">
+              <a:solidFill>
+                <a:schemeClr val="tx1">
+                  <a:lumMod val="75000"/>
+                  <a:lumOff val="25000"/>
+                </a:schemeClr>
+              </a:solidFill>
+            </a:endParaRPr>
+          </a:p>
+        </p:txBody>
+      </p:sp>
+      <p:sp>
+        <p:nvSpPr>
+          <p:cNvPr id="9" name="직사각형 8">
+            <a:extLst>
+              <a:ext uri="{FF2B5EF4-FFF2-40B4-BE49-F238E27FC236}">
+                <a16:creationId xmlns:a16="http://schemas.microsoft.com/office/drawing/2014/main" id="{E481454E-FC59-0C47-9911-0BAFC6A113A6}"/>
+              </a:ext>
+            </a:extLst>
+          </p:cNvPr>
+          <p:cNvSpPr/>
+          <p:nvPr/>
+        </p:nvSpPr>
+        <p:spPr>
+          <a:xfrm>
+            <a:off x="4312433" y="1174837"/>
+            <a:ext cx="1569862" cy="454038"/>
+          </a:xfrm>
+          <a:prstGeom prst="rect">
+            <a:avLst/>
+          </a:prstGeom>
+          <a:solidFill>
+            <a:srgbClr val="FFC000"/>
+          </a:solidFill>
+          <a:ln w="28575">
+            <a:solidFill>
+              <a:srgbClr val="FFC000"/>
+            </a:solidFill>
+          </a:ln>
+        </p:spPr>
+        <p:style>
+          <a:lnRef idx="2">
+            <a:schemeClr val="accent1">
+              <a:shade val="50000"/>
+            </a:schemeClr>
+          </a:lnRef>
+          <a:fillRef idx="1">
+            <a:schemeClr val="accent1"/>
+          </a:fillRef>
+          <a:effectRef idx="0">
+            <a:schemeClr val="accent1"/>
+          </a:effectRef>
+          <a:fontRef idx="minor">
+            <a:schemeClr val="lt1"/>
+          </a:fontRef>
+        </p:style>
+        <p:txBody>
+          <a:bodyPr rtlCol="0" anchor="t"/>
+          <a:lstStyle/>
+          <a:p>
+            <a:r>
+              <a:rPr kumimoji="1" lang="en-US" altLang="ko-KR" sz="700" dirty="0">
+                <a:solidFill>
+                  <a:schemeClr val="tx1">
+                    <a:lumMod val="75000"/>
+                    <a:lumOff val="25000"/>
+                  </a:schemeClr>
+                </a:solidFill>
+              </a:rPr>
+              <a:t>(1)</a:t>
+            </a:r>
+            <a:r>
+              <a:rPr kumimoji="1" lang="ko-KR" altLang="en-US" sz="700" dirty="0">
+                <a:solidFill>
+                  <a:schemeClr val="tx1">
+                    <a:lumMod val="75000"/>
+                    <a:lumOff val="25000"/>
+                  </a:schemeClr>
+                </a:solidFill>
+              </a:rPr>
+              <a:t> 화면을 꽉 채우는 </a:t>
+            </a:r>
+            <a:r>
+              <a:rPr kumimoji="1" lang="en-US" altLang="ko-KR" sz="700" dirty="0">
+                <a:solidFill>
+                  <a:schemeClr val="tx1">
+                    <a:lumMod val="75000"/>
+                    <a:lumOff val="25000"/>
+                  </a:schemeClr>
+                </a:solidFill>
+              </a:rPr>
+              <a:t>View</a:t>
+            </a:r>
+            <a:r>
+              <a:rPr kumimoji="1" lang="ko-KR" altLang="en-US" sz="700" dirty="0">
+                <a:solidFill>
+                  <a:schemeClr val="tx1">
+                    <a:lumMod val="75000"/>
+                    <a:lumOff val="25000"/>
+                  </a:schemeClr>
+                </a:solidFill>
+              </a:rPr>
+              <a:t>를 하나 만들고</a:t>
+            </a:r>
+            <a:r>
+              <a:rPr kumimoji="1" lang="en-US" altLang="ko-KR" sz="700" dirty="0">
+                <a:solidFill>
+                  <a:schemeClr val="tx1">
+                    <a:lumMod val="75000"/>
+                    <a:lumOff val="25000"/>
+                  </a:schemeClr>
+                </a:solidFill>
+              </a:rPr>
+              <a:t>,</a:t>
+            </a:r>
+            <a:r>
+              <a:rPr kumimoji="1" lang="ko-KR" altLang="en-US" sz="700" dirty="0">
+                <a:solidFill>
+                  <a:schemeClr val="tx1">
+                    <a:lumMod val="75000"/>
+                    <a:lumOff val="25000"/>
+                  </a:schemeClr>
+                </a:solidFill>
+              </a:rPr>
+              <a:t> 가로 배열의 </a:t>
+            </a:r>
+            <a:r>
+              <a:rPr kumimoji="1" lang="en-US" altLang="ko-KR" sz="700" dirty="0">
+                <a:solidFill>
+                  <a:schemeClr val="tx1">
+                    <a:lumMod val="75000"/>
+                    <a:lumOff val="25000"/>
+                  </a:schemeClr>
+                </a:solidFill>
+              </a:rPr>
+              <a:t>LinearLayout</a:t>
+            </a:r>
+            <a:r>
+              <a:rPr kumimoji="1" lang="ko-KR" altLang="en-US" sz="700" dirty="0">
+                <a:solidFill>
+                  <a:schemeClr val="tx1">
+                    <a:lumMod val="75000"/>
+                    <a:lumOff val="25000"/>
+                  </a:schemeClr>
+                </a:solidFill>
+              </a:rPr>
+              <a:t>을 설정합니다</a:t>
+            </a:r>
+            <a:r>
+              <a:rPr kumimoji="1" lang="en-US" altLang="ko-KR" sz="700" dirty="0">
+                <a:solidFill>
+                  <a:schemeClr val="tx1">
+                    <a:lumMod val="75000"/>
+                    <a:lumOff val="25000"/>
+                  </a:schemeClr>
+                </a:solidFill>
+              </a:rPr>
+              <a:t>.</a:t>
+            </a:r>
+          </a:p>
+        </p:txBody>
+      </p:sp>
+      <p:sp>
+        <p:nvSpPr>
+          <p:cNvPr id="11" name="직사각형 10">
+            <a:extLst>
+              <a:ext uri="{FF2B5EF4-FFF2-40B4-BE49-F238E27FC236}">
+                <a16:creationId xmlns:a16="http://schemas.microsoft.com/office/drawing/2014/main" id="{7BDA921D-0CBC-4C42-9A83-A228E849DF35}"/>
+              </a:ext>
+            </a:extLst>
+          </p:cNvPr>
+          <p:cNvSpPr/>
+          <p:nvPr/>
+        </p:nvSpPr>
+        <p:spPr>
+          <a:xfrm>
+            <a:off x="902489" y="2778595"/>
+            <a:ext cx="3769799" cy="340337"/>
+          </a:xfrm>
+          <a:prstGeom prst="rect">
+            <a:avLst/>
+          </a:prstGeom>
+          <a:solidFill>
+            <a:srgbClr val="1E1E1E"/>
+          </a:solidFill>
+          <a:ln w="28575">
+            <a:noFill/>
+          </a:ln>
+        </p:spPr>
+        <p:style>
+          <a:lnRef idx="2">
+            <a:schemeClr val="accent1">
+              <a:shade val="50000"/>
+            </a:schemeClr>
+          </a:lnRef>
+          <a:fillRef idx="1">
+            <a:schemeClr val="accent1"/>
+          </a:fillRef>
+          <a:effectRef idx="0">
+            <a:schemeClr val="accent1"/>
+          </a:effectRef>
+          <a:fontRef idx="minor">
+            <a:schemeClr val="lt1"/>
+          </a:fontRef>
+        </p:style>
+        <p:txBody>
+          <a:bodyPr rtlCol="0" anchor="t"/>
+          <a:lstStyle/>
+          <a:p>
+            <a:endParaRPr kumimoji="1" lang="ko-Kore-KR" altLang="en-US" sz="700" dirty="0">
+              <a:solidFill>
+                <a:schemeClr val="tx1">
+                  <a:lumMod val="75000"/>
+                  <a:lumOff val="25000"/>
+                </a:schemeClr>
+              </a:solidFill>
+            </a:endParaRPr>
+          </a:p>
+        </p:txBody>
+      </p:sp>
+      <p:sp>
+        <p:nvSpPr>
+          <p:cNvPr id="12" name="직사각형 11">
+            <a:extLst>
+              <a:ext uri="{FF2B5EF4-FFF2-40B4-BE49-F238E27FC236}">
+                <a16:creationId xmlns:a16="http://schemas.microsoft.com/office/drawing/2014/main" id="{49B60008-E526-9A4C-9FC5-CC911F691199}"/>
+              </a:ext>
+            </a:extLst>
+          </p:cNvPr>
+          <p:cNvSpPr/>
+          <p:nvPr/>
+        </p:nvSpPr>
+        <p:spPr>
+          <a:xfrm>
+            <a:off x="837804" y="1876430"/>
+            <a:ext cx="3474629" cy="1474180"/>
+          </a:xfrm>
+          <a:prstGeom prst="rect">
+            <a:avLst/>
+          </a:prstGeom>
+          <a:noFill/>
+          <a:ln w="28575">
+            <a:solidFill>
+              <a:srgbClr val="FFC000"/>
+            </a:solidFill>
+          </a:ln>
+        </p:spPr>
+        <p:style>
+          <a:lnRef idx="2">
+            <a:schemeClr val="accent1">
+              <a:shade val="50000"/>
+            </a:schemeClr>
+          </a:lnRef>
+          <a:fillRef idx="1">
+            <a:schemeClr val="accent1"/>
+          </a:fillRef>
+          <a:effectRef idx="0">
+            <a:schemeClr val="accent1"/>
+          </a:effectRef>
+          <a:fontRef idx="minor">
+            <a:schemeClr val="lt1"/>
+          </a:fontRef>
+        </p:style>
+        <p:txBody>
+          <a:bodyPr rtlCol="0" anchor="ctr"/>
+          <a:lstStyle/>
+          <a:p>
+            <a:pPr algn="ctr"/>
+            <a:endParaRPr kumimoji="1" lang="ko-Kore-KR" altLang="en-US"/>
+          </a:p>
+        </p:txBody>
+      </p:sp>
+      <p:sp>
+        <p:nvSpPr>
+          <p:cNvPr id="17" name="직사각형 16">
+            <a:extLst>
+              <a:ext uri="{FF2B5EF4-FFF2-40B4-BE49-F238E27FC236}">
+                <a16:creationId xmlns:a16="http://schemas.microsoft.com/office/drawing/2014/main" id="{5ED0E211-3D92-1C47-9AD5-C2DA8812FFA7}"/>
+              </a:ext>
+            </a:extLst>
+          </p:cNvPr>
+          <p:cNvSpPr/>
+          <p:nvPr/>
+        </p:nvSpPr>
+        <p:spPr>
+          <a:xfrm>
+            <a:off x="4317694" y="2034068"/>
+            <a:ext cx="1847132" cy="839564"/>
+          </a:xfrm>
+          <a:prstGeom prst="rect">
+            <a:avLst/>
+          </a:prstGeom>
+          <a:solidFill>
+            <a:srgbClr val="FFC000"/>
+          </a:solidFill>
+          <a:ln w="28575">
+            <a:solidFill>
+              <a:srgbClr val="FFC000"/>
+            </a:solidFill>
+          </a:ln>
+        </p:spPr>
+        <p:style>
+          <a:lnRef idx="2">
+            <a:schemeClr val="accent1">
+              <a:shade val="50000"/>
+            </a:schemeClr>
+          </a:lnRef>
+          <a:fillRef idx="1">
+            <a:schemeClr val="accent1"/>
+          </a:fillRef>
+          <a:effectRef idx="0">
+            <a:schemeClr val="accent1"/>
+          </a:effectRef>
+          <a:fontRef idx="minor">
+            <a:schemeClr val="lt1"/>
+          </a:fontRef>
+        </p:style>
+        <p:txBody>
+          <a:bodyPr rtlCol="0" anchor="t"/>
+          <a:lstStyle/>
+          <a:p>
+            <a:r>
+              <a:rPr kumimoji="1" lang="en-US" altLang="ko-KR" sz="700" dirty="0">
+                <a:solidFill>
+                  <a:schemeClr val="tx1">
+                    <a:lumMod val="75000"/>
+                    <a:lumOff val="25000"/>
+                  </a:schemeClr>
+                </a:solidFill>
+              </a:rPr>
+              <a:t>(2)</a:t>
+            </a:r>
+            <a:r>
+              <a:rPr kumimoji="1" lang="ko-KR" altLang="en-US" sz="700" dirty="0">
+                <a:solidFill>
+                  <a:schemeClr val="tx1">
+                    <a:lumMod val="75000"/>
+                    <a:lumOff val="25000"/>
+                  </a:schemeClr>
+                </a:solidFill>
+              </a:rPr>
+              <a:t> 가로의 </a:t>
+            </a:r>
+            <a:r>
+              <a:rPr kumimoji="1" lang="en-US" altLang="ko-KR" sz="700" dirty="0">
+                <a:solidFill>
+                  <a:schemeClr val="tx1">
+                    <a:lumMod val="75000"/>
+                    <a:lumOff val="25000"/>
+                  </a:schemeClr>
+                </a:solidFill>
+              </a:rPr>
+              <a:t>50%</a:t>
+            </a:r>
+            <a:r>
+              <a:rPr kumimoji="1" lang="ko-KR" altLang="en-US" sz="700" dirty="0">
+                <a:solidFill>
+                  <a:schemeClr val="tx1">
+                    <a:lumMod val="75000"/>
+                    <a:lumOff val="25000"/>
+                  </a:schemeClr>
+                </a:solidFill>
+              </a:rPr>
+              <a:t>를 차지하는 </a:t>
+            </a:r>
+            <a:r>
+              <a:rPr kumimoji="1" lang="en-US" altLang="ko-KR" sz="700" dirty="0">
+                <a:solidFill>
+                  <a:schemeClr val="tx1">
+                    <a:lumMod val="75000"/>
+                    <a:lumOff val="25000"/>
+                  </a:schemeClr>
+                </a:solidFill>
+              </a:rPr>
+              <a:t>Child View</a:t>
+            </a:r>
+            <a:r>
+              <a:rPr kumimoji="1" lang="ko-KR" altLang="en-US" sz="700" dirty="0">
+                <a:solidFill>
+                  <a:schemeClr val="tx1">
+                    <a:lumMod val="75000"/>
+                    <a:lumOff val="25000"/>
+                  </a:schemeClr>
+                </a:solidFill>
+              </a:rPr>
+              <a:t>를 만들고</a:t>
+            </a:r>
+            <a:r>
+              <a:rPr kumimoji="1" lang="en-US" altLang="ko-KR" sz="700" dirty="0">
+                <a:solidFill>
+                  <a:schemeClr val="tx1">
+                    <a:lumMod val="75000"/>
+                    <a:lumOff val="25000"/>
+                  </a:schemeClr>
+                </a:solidFill>
+              </a:rPr>
+              <a:t>,</a:t>
+            </a:r>
+            <a:r>
+              <a:rPr kumimoji="1" lang="ko-KR" altLang="en-US" sz="700" dirty="0">
+                <a:solidFill>
+                  <a:schemeClr val="tx1">
+                    <a:lumMod val="75000"/>
+                    <a:lumOff val="25000"/>
+                  </a:schemeClr>
+                </a:solidFill>
+              </a:rPr>
+              <a:t> 세로 배열의 </a:t>
+            </a:r>
+            <a:r>
+              <a:rPr kumimoji="1" lang="en-US" altLang="ko-KR" sz="700" dirty="0">
+                <a:solidFill>
+                  <a:schemeClr val="tx1">
+                    <a:lumMod val="75000"/>
+                    <a:lumOff val="25000"/>
+                  </a:schemeClr>
+                </a:solidFill>
+              </a:rPr>
+              <a:t>LinearLayout</a:t>
+            </a:r>
+            <a:r>
+              <a:rPr kumimoji="1" lang="ko-KR" altLang="en-US" sz="700" dirty="0">
+                <a:solidFill>
+                  <a:schemeClr val="tx1">
+                    <a:lumMod val="75000"/>
+                    <a:lumOff val="25000"/>
+                  </a:schemeClr>
+                </a:solidFill>
+              </a:rPr>
+              <a:t>을 설정합니다</a:t>
+            </a:r>
+            <a:r>
+              <a:rPr kumimoji="1" lang="en-US" altLang="ko-KR" sz="700" dirty="0">
+                <a:solidFill>
+                  <a:schemeClr val="tx1">
+                    <a:lumMod val="75000"/>
+                    <a:lumOff val="25000"/>
+                  </a:schemeClr>
+                </a:solidFill>
+              </a:rPr>
+              <a:t>.</a:t>
+            </a:r>
+          </a:p>
+          <a:p>
+            <a:endParaRPr kumimoji="1" lang="en-US" altLang="ko-Kore-KR" sz="700" dirty="0">
+              <a:solidFill>
+                <a:schemeClr val="tx1">
+                  <a:lumMod val="75000"/>
+                  <a:lumOff val="25000"/>
+                </a:schemeClr>
+              </a:solidFill>
+            </a:endParaRPr>
+          </a:p>
+          <a:p>
+            <a:r>
+              <a:rPr kumimoji="1" lang="ko-KR" altLang="en-US" sz="700" dirty="0">
+                <a:solidFill>
+                  <a:schemeClr val="tx1">
+                    <a:lumMod val="75000"/>
+                    <a:lumOff val="25000"/>
+                  </a:schemeClr>
+                </a:solidFill>
+              </a:rPr>
+              <a:t>여기에 줄줄이 컴포넌트를 넣을 예정입니다</a:t>
+            </a:r>
+            <a:r>
+              <a:rPr kumimoji="1" lang="en-US" altLang="ko-KR" sz="700" dirty="0">
+                <a:solidFill>
+                  <a:schemeClr val="tx1">
+                    <a:lumMod val="75000"/>
+                    <a:lumOff val="25000"/>
+                  </a:schemeClr>
+                </a:solidFill>
+              </a:rPr>
+              <a:t>.</a:t>
+            </a:r>
+            <a:endParaRPr kumimoji="1" lang="en-US" altLang="ko-Kore-KR" sz="700" dirty="0">
+              <a:solidFill>
+                <a:schemeClr val="tx1">
+                  <a:lumMod val="75000"/>
+                  <a:lumOff val="25000"/>
+                </a:schemeClr>
+              </a:solidFill>
+            </a:endParaRPr>
+          </a:p>
+          <a:p>
+            <a:endParaRPr kumimoji="1" lang="ko-Kore-KR" altLang="en-US" sz="700" dirty="0">
+              <a:solidFill>
+                <a:schemeClr val="tx1">
+                  <a:lumMod val="75000"/>
+                  <a:lumOff val="25000"/>
+                </a:schemeClr>
+              </a:solidFill>
+            </a:endParaRPr>
+          </a:p>
+        </p:txBody>
+      </p:sp>
+    </p:spTree>
+    <p:extLst>
+      <p:ext uri="{BB962C8B-B14F-4D97-AF65-F5344CB8AC3E}">
+        <p14:creationId xmlns:p14="http://schemas.microsoft.com/office/powerpoint/2010/main" val="1750311276"/>
+      </p:ext>
+    </p:extLst>
+  </p:cSld>
+  <p:clrMapOvr>
+    <a:masterClrMapping/>
+  </p:clrMapOvr>
+</p:sld>
+</file>
+
+<file path=ppt/slides/slide4.xml><?xml version="1.0" encoding="utf-8"?>
+<p:sld xmlns:a="http://schemas.openxmlformats.org/drawingml/2006/main" xmlns:r="http://schemas.openxmlformats.org/officeDocument/2006/relationships" xmlns:p="http://schemas.openxmlformats.org/presentationml/2006/main">
+  <p:cSld>
+    <p:spTree>
+      <p:nvGrpSpPr>
+        <p:cNvPr id="1" name=""/>
+        <p:cNvGrpSpPr/>
+        <p:nvPr/>
+      </p:nvGrpSpPr>
+      <p:grpSpPr>
+        <a:xfrm>
+          <a:off x="0" y="0"/>
+          <a:ext cx="0" cy="0"/>
+          <a:chOff x="0" y="0"/>
+          <a:chExt cx="0" cy="0"/>
+        </a:xfrm>
+      </p:grpSpPr>
+      <p:sp>
+        <p:nvSpPr>
+          <p:cNvPr id="4" name="TextBox 3">
+            <a:extLst>
+              <a:ext uri="{FF2B5EF4-FFF2-40B4-BE49-F238E27FC236}">
+                <a16:creationId xmlns:a16="http://schemas.microsoft.com/office/drawing/2014/main" id="{15F56F27-DB5D-C645-8F0F-6F398574EE57}"/>
+              </a:ext>
+            </a:extLst>
+          </p:cNvPr>
+          <p:cNvSpPr txBox="1"/>
+          <p:nvPr/>
+        </p:nvSpPr>
+        <p:spPr>
+          <a:xfrm>
+            <a:off x="6487" y="1977957"/>
+            <a:ext cx="12192000" cy="1815882"/>
+          </a:xfrm>
+          <a:prstGeom prst="rect">
+            <a:avLst/>
+          </a:prstGeom>
+          <a:noFill/>
+        </p:spPr>
+        <p:txBody>
+          <a:bodyPr wrap="square" rtlCol="0">
+            <a:spAutoFit/>
+          </a:bodyPr>
+          <a:lstStyle/>
+          <a:p>
+            <a:pPr algn="ctr"/>
+            <a:r>
+              <a:rPr kumimoji="1" lang="en-US" altLang="ko-Kore-KR" sz="7200" dirty="0"/>
+              <a:t>Button</a:t>
+            </a:r>
+          </a:p>
+          <a:p>
+            <a:pPr algn="ctr"/>
+            <a:r>
+              <a:rPr kumimoji="1" lang="ko-Kore-KR" altLang="en-US" sz="2000" dirty="0"/>
+              <a:t>가장</a:t>
+            </a:r>
+            <a:r>
+              <a:rPr kumimoji="1" lang="ko-KR" altLang="en-US" sz="2000" dirty="0"/>
+              <a:t> 기본이 되는 컴포넌트로</a:t>
+            </a:r>
+            <a:endParaRPr kumimoji="1" lang="en-US" altLang="ko-KR" sz="2000" dirty="0"/>
+          </a:p>
+          <a:p>
+            <a:pPr algn="ctr"/>
+            <a:r>
+              <a:rPr kumimoji="1" lang="ko-KR" altLang="en-US" sz="2000" dirty="0"/>
+              <a:t>클릭 이벤트를 제공하는 것이 특징입니다</a:t>
+            </a:r>
+            <a:r>
+              <a:rPr kumimoji="1" lang="en-US" altLang="ko-KR" sz="2000" dirty="0"/>
+              <a:t>.</a:t>
+            </a:r>
+            <a:endParaRPr kumimoji="1" lang="ko-Kore-KR" altLang="en-US" sz="2000" dirty="0"/>
+          </a:p>
+        </p:txBody>
+      </p:sp>
+    </p:spTree>
+    <p:extLst>
+      <p:ext uri="{BB962C8B-B14F-4D97-AF65-F5344CB8AC3E}">
+        <p14:creationId xmlns:p14="http://schemas.microsoft.com/office/powerpoint/2010/main" val="789444832"/>
+      </p:ext>
+    </p:extLst>
+  </p:cSld>
+  <p:clrMapOvr>
+    <a:masterClrMapping/>
+  </p:clrMapOvr>
+</p:sld>
+</file>
+
+<file path=ppt/slides/slide5.xml><?xml version="1.0" encoding="utf-8"?>
+<p:sld xmlns:a="http://schemas.openxmlformats.org/drawingml/2006/main" xmlns:r="http://schemas.openxmlformats.org/officeDocument/2006/relationships" xmlns:p="http://schemas.openxmlformats.org/presentationml/2006/main">
+  <p:cSld>
+    <p:spTree>
+      <p:nvGrpSpPr>
+        <p:cNvPr id="1" name=""/>
+        <p:cNvGrpSpPr/>
+        <p:nvPr/>
+      </p:nvGrpSpPr>
+      <p:grpSpPr>
+        <a:xfrm>
+          <a:off x="0" y="0"/>
+          <a:ext cx="0" cy="0"/>
+          <a:chOff x="0" y="0"/>
+          <a:chExt cx="0" cy="0"/>
+        </a:xfrm>
+      </p:grpSpPr>
+      <p:pic>
+        <p:nvPicPr>
+          <p:cNvPr id="3" name="그림 2">
+            <a:extLst>
+              <a:ext uri="{FF2B5EF4-FFF2-40B4-BE49-F238E27FC236}">
+                <a16:creationId xmlns:a16="http://schemas.microsoft.com/office/drawing/2014/main" id="{22632FA0-D2BD-0245-BE3E-AE432CA45D1F}"/>
+              </a:ext>
+            </a:extLst>
+          </p:cNvPr>
+          <p:cNvPicPr>
+            <a:picLocks noChangeAspect="1"/>
+          </p:cNvPicPr>
+          <p:nvPr/>
+        </p:nvPicPr>
+        <p:blipFill>
+          <a:blip r:embed="rId2"/>
+          <a:stretch>
+            <a:fillRect/>
+          </a:stretch>
+        </p:blipFill>
+        <p:spPr>
+          <a:xfrm>
+            <a:off x="44252" y="0"/>
+            <a:ext cx="12103496" cy="6858000"/>
+          </a:xfrm>
+          <a:prstGeom prst="rect">
+            <a:avLst/>
+          </a:prstGeom>
+        </p:spPr>
+      </p:pic>
       <p:sp>
         <p:nvSpPr>
           <p:cNvPr id="13" name="직사각형 12">
@@ -5976,8 +8607,8 @@
         </p:nvSpPr>
         <p:spPr>
           <a:xfrm>
-            <a:off x="2619983" y="2453908"/>
-            <a:ext cx="2360579" cy="356681"/>
+            <a:off x="2619983" y="1993982"/>
+            <a:ext cx="2360579" cy="816607"/>
           </a:xfrm>
           <a:prstGeom prst="rect">
             <a:avLst/>
@@ -6022,17 +8653,8 @@
               </a:rPr>
               <a:t>(1)</a:t>
             </a:r>
-            <a:r>
-              <a:rPr kumimoji="1" lang="ko-KR" altLang="en-US" sz="700" dirty="0">
-                <a:solidFill>
-                  <a:schemeClr val="tx1">
-                    <a:lumMod val="75000"/>
-                    <a:lumOff val="25000"/>
-                  </a:schemeClr>
-                </a:solidFill>
-              </a:rPr>
-              <a:t> </a:t>
-            </a:r>
+          </a:p>
+          <a:p>
             <a:r>
               <a:rPr kumimoji="1" lang="ko-Kore-KR" altLang="en-US" sz="700" dirty="0">
                 <a:solidFill>
@@ -6053,8 +8675,21 @@
                   </a:schemeClr>
                 </a:solidFill>
               </a:rPr>
-              <a:t> 배치</a:t>
-            </a:r>
+              <a:t>을 하나 생성합니다</a:t>
+            </a:r>
+            <a:r>
+              <a:rPr kumimoji="1" lang="en-US" altLang="ko-KR" sz="700" dirty="0">
+                <a:solidFill>
+                  <a:schemeClr val="tx1">
+                    <a:lumMod val="75000"/>
+                    <a:lumOff val="25000"/>
+                  </a:schemeClr>
+                </a:solidFill>
+              </a:rPr>
+              <a:t>.</a:t>
+            </a:r>
+          </a:p>
+          <a:p>
             <a:endParaRPr kumimoji="1" lang="en-US" altLang="ko-KR" sz="700" dirty="0">
               <a:solidFill>
                 <a:schemeClr val="tx1">
@@ -6066,17 +8701,6 @@
           </a:p>
           <a:p>
             <a:r>
-              <a:rPr kumimoji="1" lang="ko-KR" altLang="en-US" sz="700" dirty="0">
-                <a:solidFill>
-                  <a:schemeClr val="tx1">
-                    <a:lumMod val="75000"/>
-                    <a:lumOff val="25000"/>
-                  </a:schemeClr>
-                </a:solidFill>
-              </a:rPr>
-              <a:t>* </a:t>
-            </a:r>
-            <a:r>
               <a:rPr kumimoji="1" lang="en-US" altLang="ko-KR" sz="700" dirty="0">
                 <a:solidFill>
                   <a:schemeClr val="tx1">
@@ -6140,16 +8764,142 @@
                   </a:schemeClr>
                 </a:solidFill>
               </a:rPr>
-              <a:t> 연결</a:t>
-            </a:r>
-            <a:endParaRPr kumimoji="1" lang="en-US" altLang="ko-KR" sz="700" dirty="0">
-              <a:solidFill>
-                <a:schemeClr val="tx1">
-                  <a:lumMod val="75000"/>
-                  <a:lumOff val="25000"/>
-                </a:schemeClr>
-              </a:solidFill>
-            </a:endParaRPr>
+              <a:t> 연결합니다</a:t>
+            </a:r>
+            <a:r>
+              <a:rPr kumimoji="1" lang="en-US" altLang="ko-KR" sz="700" dirty="0">
+                <a:solidFill>
+                  <a:schemeClr val="tx1">
+                    <a:lumMod val="75000"/>
+                    <a:lumOff val="25000"/>
+                  </a:schemeClr>
+                </a:solidFill>
+              </a:rPr>
+              <a:t>.</a:t>
+            </a:r>
+          </a:p>
+          <a:p>
+            <a:r>
+              <a:rPr kumimoji="1" lang="en-US" altLang="ko-KR" sz="700" dirty="0">
+                <a:solidFill>
+                  <a:schemeClr val="tx1">
+                    <a:lumMod val="75000"/>
+                    <a:lumOff val="25000"/>
+                  </a:schemeClr>
+                </a:solidFill>
+              </a:rPr>
+              <a:t>OnButtonClicked </a:t>
+            </a:r>
+            <a:r>
+              <a:rPr kumimoji="1" lang="ko-KR" altLang="en-US" sz="700" dirty="0">
+                <a:solidFill>
+                  <a:schemeClr val="tx1">
+                    <a:lumMod val="75000"/>
+                    <a:lumOff val="25000"/>
+                  </a:schemeClr>
+                </a:solidFill>
+              </a:rPr>
+              <a:t>메소드는 </a:t>
+            </a:r>
+            <a:r>
+              <a:rPr kumimoji="1" lang="en-US" altLang="ko-KR" sz="700" dirty="0">
+                <a:solidFill>
+                  <a:schemeClr val="tx1">
+                    <a:lumMod val="75000"/>
+                    <a:lumOff val="25000"/>
+                  </a:schemeClr>
+                </a:solidFill>
+              </a:rPr>
+              <a:t>xaml</a:t>
+            </a:r>
+            <a:r>
+              <a:rPr kumimoji="1" lang="ko-KR" altLang="en-US" sz="700" dirty="0">
+                <a:solidFill>
+                  <a:schemeClr val="tx1">
+                    <a:lumMod val="75000"/>
+                    <a:lumOff val="25000"/>
+                  </a:schemeClr>
+                </a:solidFill>
+              </a:rPr>
+              <a:t>에 상응하는 </a:t>
+            </a:r>
+            <a:r>
+              <a:rPr kumimoji="1" lang="en-US" altLang="ko-KR" sz="700" dirty="0">
+                <a:solidFill>
+                  <a:schemeClr val="tx1">
+                    <a:lumMod val="75000"/>
+                    <a:lumOff val="25000"/>
+                  </a:schemeClr>
+                </a:solidFill>
+              </a:rPr>
+              <a:t>cs</a:t>
+            </a:r>
+            <a:r>
+              <a:rPr kumimoji="1" lang="ko-KR" altLang="en-US" sz="700" dirty="0">
+                <a:solidFill>
+                  <a:schemeClr val="tx1">
+                    <a:lumMod val="75000"/>
+                    <a:lumOff val="25000"/>
+                  </a:schemeClr>
+                </a:solidFill>
+              </a:rPr>
+              <a:t>파일에 정의해 줍니다</a:t>
+            </a:r>
+            <a:r>
+              <a:rPr kumimoji="1" lang="en-US" altLang="ko-KR" sz="700" dirty="0">
+                <a:solidFill>
+                  <a:schemeClr val="tx1">
+                    <a:lumMod val="75000"/>
+                    <a:lumOff val="25000"/>
+                  </a:schemeClr>
+                </a:solidFill>
+              </a:rPr>
+              <a:t>.</a:t>
+            </a:r>
+            <a:r>
+              <a:rPr kumimoji="1" lang="ko-KR" altLang="en-US" sz="700" dirty="0">
+                <a:solidFill>
+                  <a:schemeClr val="tx1">
+                    <a:lumMod val="75000"/>
+                    <a:lumOff val="25000"/>
+                  </a:schemeClr>
+                </a:solidFill>
+              </a:rPr>
+              <a:t> </a:t>
+            </a:r>
+            <a:r>
+              <a:rPr kumimoji="1" lang="en-US" altLang="ko-KR" sz="700" dirty="0">
+                <a:solidFill>
+                  <a:schemeClr val="tx1">
+                    <a:lumMod val="75000"/>
+                    <a:lumOff val="25000"/>
+                  </a:schemeClr>
+                </a:solidFill>
+              </a:rPr>
+              <a:t>(</a:t>
+            </a:r>
+            <a:r>
+              <a:rPr kumimoji="1" lang="ko-KR" altLang="en-US" sz="700" dirty="0">
+                <a:solidFill>
+                  <a:schemeClr val="tx1">
+                    <a:lumMod val="75000"/>
+                    <a:lumOff val="25000"/>
+                  </a:schemeClr>
+                </a:solidFill>
+              </a:rPr>
+              <a:t>우측 참고</a:t>
+            </a:r>
+            <a:r>
+              <a:rPr kumimoji="1" lang="en-US" altLang="ko-KR" sz="700" dirty="0">
+                <a:solidFill>
+                  <a:schemeClr val="tx1">
+                    <a:lumMod val="75000"/>
+                    <a:lumOff val="25000"/>
+                  </a:schemeClr>
+                </a:solidFill>
+              </a:rPr>
+              <a:t>)</a:t>
+            </a:r>
           </a:p>
         </p:txBody>
       </p:sp>
@@ -6220,7 +8970,7 @@
         <p:spPr>
           <a:xfrm>
             <a:off x="7805719" y="2827183"/>
-            <a:ext cx="2013704" cy="359923"/>
+            <a:ext cx="2013704" cy="671134"/>
           </a:xfrm>
           <a:prstGeom prst="rect">
             <a:avLst/>
@@ -6263,19 +9013,10 @@
                   </a:schemeClr>
                 </a:solidFill>
               </a:rPr>
-              <a:t>(3)</a:t>
-            </a:r>
-            <a:r>
-              <a:rPr kumimoji="1" lang="ko-KR" altLang="en-US" sz="700" dirty="0">
-                <a:solidFill>
-                  <a:schemeClr val="tx1">
-                    <a:lumMod val="75000"/>
-                    <a:lumOff val="25000"/>
-                  </a:schemeClr>
-                </a:solidFill>
-              </a:rPr>
-              <a:t> </a:t>
-            </a:r>
+              <a:t>(2)</a:t>
+            </a:r>
+          </a:p>
+          <a:p>
             <a:r>
               <a:rPr kumimoji="1" lang="en-US" altLang="ko-KR" sz="700" dirty="0" err="1">
                 <a:solidFill>
@@ -6398,7 +9139,7 @@
 </p:sld>
 </file>
 
-<file path=ppt/slides/slide4.xml><?xml version="1.0" encoding="utf-8"?>
+<file path=ppt/slides/slide6.xml><?xml version="1.0" encoding="utf-8"?>
 <p:sld xmlns:a="http://schemas.openxmlformats.org/drawingml/2006/main" xmlns:r="http://schemas.openxmlformats.org/officeDocument/2006/relationships" xmlns:p="http://schemas.openxmlformats.org/presentationml/2006/main">
   <p:cSld>
     <p:spTree>
@@ -6613,7 +9354,7 @@
 </p:sld>
 </file>
 
-<file path=ppt/slides/slide5.xml><?xml version="1.0" encoding="utf-8"?>
+<file path=ppt/slides/slide7.xml><?xml version="1.0" encoding="utf-8"?>
 <p:sld xmlns:a="http://schemas.openxmlformats.org/drawingml/2006/main" xmlns:r="http://schemas.openxmlformats.org/officeDocument/2006/relationships" xmlns:p="http://schemas.openxmlformats.org/presentationml/2006/main">
   <p:cSld>
     <p:spTree>
@@ -6702,7 +9443,7 @@
 </p:sld>
 </file>
 
-<file path=ppt/slides/slide6.xml><?xml version="1.0" encoding="utf-8"?>
+<file path=ppt/slides/slide8.xml><?xml version="1.0" encoding="utf-8"?>
 <p:sld xmlns:a="http://schemas.openxmlformats.org/drawingml/2006/main" xmlns:r="http://schemas.openxmlformats.org/officeDocument/2006/relationships" xmlns:p="http://schemas.openxmlformats.org/presentationml/2006/main">
   <p:cSld>
     <p:spTree>
@@ -7406,7 +10147,7 @@
 </p:sld>
 </file>
 
-<file path=ppt/slides/slide7.xml><?xml version="1.0" encoding="utf-8"?>
+<file path=ppt/slides/slide9.xml><?xml version="1.0" encoding="utf-8"?>
 <p:sld xmlns:a="http://schemas.openxmlformats.org/drawingml/2006/main" xmlns:r="http://schemas.openxmlformats.org/officeDocument/2006/relationships" xmlns:p="http://schemas.openxmlformats.org/presentationml/2006/main">
   <p:cSld>
     <p:spTree>
@@ -7635,1381 +10376,6 @@
     <p:extLst>
       <p:ext uri="{BB962C8B-B14F-4D97-AF65-F5344CB8AC3E}">
         <p14:creationId xmlns:p14="http://schemas.microsoft.com/office/powerpoint/2010/main" val="1324323339"/>
-      </p:ext>
-    </p:extLst>
-  </p:cSld>
-  <p:clrMapOvr>
-    <a:masterClrMapping/>
-  </p:clrMapOvr>
-</p:sld>
-</file>
-
-<file path=ppt/slides/slide8.xml><?xml version="1.0" encoding="utf-8"?>
-<p:sld xmlns:a="http://schemas.openxmlformats.org/drawingml/2006/main" xmlns:r="http://schemas.openxmlformats.org/officeDocument/2006/relationships" xmlns:p="http://schemas.openxmlformats.org/presentationml/2006/main">
-  <p:cSld>
-    <p:spTree>
-      <p:nvGrpSpPr>
-        <p:cNvPr id="1" name=""/>
-        <p:cNvGrpSpPr/>
-        <p:nvPr/>
-      </p:nvGrpSpPr>
-      <p:grpSpPr>
-        <a:xfrm>
-          <a:off x="0" y="0"/>
-          <a:ext cx="0" cy="0"/>
-          <a:chOff x="0" y="0"/>
-          <a:chExt cx="0" cy="0"/>
-        </a:xfrm>
-      </p:grpSpPr>
-      <p:sp>
-        <p:nvSpPr>
-          <p:cNvPr id="4" name="TextBox 3">
-            <a:extLst>
-              <a:ext uri="{FF2B5EF4-FFF2-40B4-BE49-F238E27FC236}">
-                <a16:creationId xmlns:a16="http://schemas.microsoft.com/office/drawing/2014/main" id="{15F56F27-DB5D-C645-8F0F-6F398574EE57}"/>
-              </a:ext>
-            </a:extLst>
-          </p:cNvPr>
-          <p:cNvSpPr txBox="1"/>
-          <p:nvPr/>
-        </p:nvSpPr>
-        <p:spPr>
-          <a:xfrm>
-            <a:off x="6487" y="1977957"/>
-            <a:ext cx="12192000" cy="3354765"/>
-          </a:xfrm>
-          <a:prstGeom prst="rect">
-            <a:avLst/>
-          </a:prstGeom>
-          <a:noFill/>
-        </p:spPr>
-        <p:txBody>
-          <a:bodyPr wrap="square" rtlCol="0">
-            <a:spAutoFit/>
-          </a:bodyPr>
-          <a:lstStyle/>
-          <a:p>
-            <a:pPr algn="ctr"/>
-            <a:r>
-              <a:rPr kumimoji="1" lang="en-US" altLang="ko-Kore-KR" sz="7200" dirty="0" err="1"/>
-              <a:t>RadioButton</a:t>
-            </a:r>
-            <a:endParaRPr kumimoji="1" lang="en-US" altLang="ko-Kore-KR" sz="7200" dirty="0"/>
-          </a:p>
-          <a:p>
-            <a:pPr algn="ctr"/>
-            <a:r>
-              <a:rPr kumimoji="1" lang="ko-KR" altLang="en-US" sz="2000" dirty="0"/>
-              <a:t>원형 아이콘을 가진 버튼입니다</a:t>
-            </a:r>
-            <a:r>
-              <a:rPr kumimoji="1" lang="en-US" altLang="ko-KR" sz="2000" dirty="0"/>
-              <a:t>.</a:t>
-            </a:r>
-          </a:p>
-          <a:p>
-            <a:pPr algn="ctr"/>
-            <a:endParaRPr kumimoji="1" lang="en-US" altLang="ko-Kore-KR" sz="2000" dirty="0"/>
-          </a:p>
-          <a:p>
-            <a:pPr algn="ctr"/>
-            <a:r>
-              <a:rPr kumimoji="1" lang="ko-Kore-KR" altLang="en-US" sz="2000" dirty="0"/>
-              <a:t>라디오</a:t>
-            </a:r>
-            <a:r>
-              <a:rPr kumimoji="1" lang="ko-KR" altLang="en-US" sz="2000" dirty="0"/>
-              <a:t>버튼과 </a:t>
-            </a:r>
-            <a:r>
-              <a:rPr kumimoji="1" lang="ko-KR" altLang="en-US" sz="2000" dirty="0" err="1"/>
-              <a:t>체크박스의</a:t>
-            </a:r>
-            <a:r>
-              <a:rPr kumimoji="1" lang="ko-KR" altLang="en-US" sz="2000" dirty="0"/>
-              <a:t> 차이점은</a:t>
-            </a:r>
-            <a:endParaRPr kumimoji="1" lang="en-US" altLang="ko-KR" sz="2000" dirty="0"/>
-          </a:p>
-          <a:p>
-            <a:pPr algn="ctr"/>
-            <a:r>
-              <a:rPr kumimoji="1" lang="ko-KR" altLang="en-US" sz="2000" dirty="0" err="1"/>
-              <a:t>그룹핑입니다</a:t>
-            </a:r>
-            <a:r>
-              <a:rPr kumimoji="1" lang="en-US" altLang="ko-KR" sz="2000" dirty="0"/>
-              <a:t>.</a:t>
-            </a:r>
-          </a:p>
-          <a:p>
-            <a:pPr algn="ctr"/>
-            <a:endParaRPr kumimoji="1" lang="en-US" altLang="ko-KR" sz="2000" dirty="0"/>
-          </a:p>
-          <a:p>
-            <a:pPr algn="ctr"/>
-            <a:r>
-              <a:rPr kumimoji="1" lang="ko-KR" altLang="en-US" sz="2000" dirty="0"/>
-              <a:t>라디오 버튼들은 그룹으로 묶을 수 있고</a:t>
-            </a:r>
-            <a:endParaRPr kumimoji="1" lang="en-US" altLang="ko-KR" sz="2000" dirty="0"/>
-          </a:p>
-          <a:p>
-            <a:pPr algn="ctr"/>
-            <a:r>
-              <a:rPr kumimoji="1" lang="ko-KR" altLang="en-US" sz="2000" dirty="0"/>
-              <a:t>한 그룹 안에서는 하나의 라디오버튼만 선택할 수 있습니다</a:t>
-            </a:r>
-            <a:r>
-              <a:rPr kumimoji="1" lang="en-US" altLang="ko-KR" sz="2000" dirty="0"/>
-              <a:t>.</a:t>
-            </a:r>
-            <a:endParaRPr kumimoji="1" lang="ko-Kore-KR" altLang="en-US" sz="2000" dirty="0"/>
-          </a:p>
-        </p:txBody>
-      </p:sp>
-    </p:spTree>
-    <p:extLst>
-      <p:ext uri="{BB962C8B-B14F-4D97-AF65-F5344CB8AC3E}">
-        <p14:creationId xmlns:p14="http://schemas.microsoft.com/office/powerpoint/2010/main" val="2129825057"/>
-      </p:ext>
-    </p:extLst>
-  </p:cSld>
-  <p:clrMapOvr>
-    <a:masterClrMapping/>
-  </p:clrMapOvr>
-</p:sld>
-</file>
-
-<file path=ppt/slides/slide9.xml><?xml version="1.0" encoding="utf-8"?>
-<p:sld xmlns:a="http://schemas.openxmlformats.org/drawingml/2006/main" xmlns:r="http://schemas.openxmlformats.org/officeDocument/2006/relationships" xmlns:p="http://schemas.openxmlformats.org/presentationml/2006/main">
-  <p:cSld>
-    <p:spTree>
-      <p:nvGrpSpPr>
-        <p:cNvPr id="1" name=""/>
-        <p:cNvGrpSpPr/>
-        <p:nvPr/>
-      </p:nvGrpSpPr>
-      <p:grpSpPr>
-        <a:xfrm>
-          <a:off x="0" y="0"/>
-          <a:ext cx="0" cy="0"/>
-          <a:chOff x="0" y="0"/>
-          <a:chExt cx="0" cy="0"/>
-        </a:xfrm>
-      </p:grpSpPr>
-      <p:pic>
-        <p:nvPicPr>
-          <p:cNvPr id="6" name="그림 5">
-            <a:extLst>
-              <a:ext uri="{FF2B5EF4-FFF2-40B4-BE49-F238E27FC236}">
-                <a16:creationId xmlns:a16="http://schemas.microsoft.com/office/drawing/2014/main" id="{236106DF-973E-4F4E-AF8D-4F74AD551616}"/>
-              </a:ext>
-            </a:extLst>
-          </p:cNvPr>
-          <p:cNvPicPr>
-            <a:picLocks noChangeAspect="1"/>
-          </p:cNvPicPr>
-          <p:nvPr/>
-        </p:nvPicPr>
-        <p:blipFill>
-          <a:blip r:embed="rId2"/>
-          <a:stretch>
-            <a:fillRect/>
-          </a:stretch>
-        </p:blipFill>
-        <p:spPr>
-          <a:xfrm>
-            <a:off x="44252" y="0"/>
-            <a:ext cx="12103496" cy="6858000"/>
-          </a:xfrm>
-          <a:prstGeom prst="rect">
-            <a:avLst/>
-          </a:prstGeom>
-        </p:spPr>
-      </p:pic>
-      <p:sp>
-        <p:nvSpPr>
-          <p:cNvPr id="11" name="직사각형 10">
-            <a:extLst>
-              <a:ext uri="{FF2B5EF4-FFF2-40B4-BE49-F238E27FC236}">
-                <a16:creationId xmlns:a16="http://schemas.microsoft.com/office/drawing/2014/main" id="{E6710D9F-0B89-AE46-B8DC-F72FBD6FB158}"/>
-              </a:ext>
-            </a:extLst>
-          </p:cNvPr>
-          <p:cNvSpPr/>
-          <p:nvPr/>
-        </p:nvSpPr>
-        <p:spPr>
-          <a:xfrm>
-            <a:off x="843064" y="3893210"/>
-            <a:ext cx="4753583" cy="1050587"/>
-          </a:xfrm>
-          <a:prstGeom prst="rect">
-            <a:avLst/>
-          </a:prstGeom>
-          <a:noFill/>
-          <a:ln w="28575">
-            <a:solidFill>
-              <a:srgbClr val="FFC000"/>
-            </a:solidFill>
-          </a:ln>
-        </p:spPr>
-        <p:style>
-          <a:lnRef idx="2">
-            <a:schemeClr val="accent1">
-              <a:shade val="50000"/>
-            </a:schemeClr>
-          </a:lnRef>
-          <a:fillRef idx="1">
-            <a:schemeClr val="accent1"/>
-          </a:fillRef>
-          <a:effectRef idx="0">
-            <a:schemeClr val="accent1"/>
-          </a:effectRef>
-          <a:fontRef idx="minor">
-            <a:schemeClr val="lt1"/>
-          </a:fontRef>
-        </p:style>
-        <p:txBody>
-          <a:bodyPr rtlCol="0" anchor="ctr"/>
-          <a:lstStyle/>
-          <a:p>
-            <a:pPr algn="ctr"/>
-            <a:endParaRPr kumimoji="1" lang="ko-Kore-KR" altLang="en-US"/>
-          </a:p>
-        </p:txBody>
-      </p:sp>
-      <p:sp>
-        <p:nvSpPr>
-          <p:cNvPr id="12" name="직사각형 11">
-            <a:extLst>
-              <a:ext uri="{FF2B5EF4-FFF2-40B4-BE49-F238E27FC236}">
-                <a16:creationId xmlns:a16="http://schemas.microsoft.com/office/drawing/2014/main" id="{703B1D49-BD3F-7E4B-90E8-DB6C0D3D764F}"/>
-              </a:ext>
-            </a:extLst>
-          </p:cNvPr>
-          <p:cNvSpPr/>
-          <p:nvPr/>
-        </p:nvSpPr>
-        <p:spPr>
-          <a:xfrm>
-            <a:off x="1952017" y="4943797"/>
-            <a:ext cx="3644630" cy="642026"/>
-          </a:xfrm>
-          <a:prstGeom prst="rect">
-            <a:avLst/>
-          </a:prstGeom>
-          <a:solidFill>
-            <a:srgbClr val="FFC000"/>
-          </a:solidFill>
-          <a:ln w="28575">
-            <a:solidFill>
-              <a:srgbClr val="FFC000"/>
-            </a:solidFill>
-          </a:ln>
-        </p:spPr>
-        <p:style>
-          <a:lnRef idx="2">
-            <a:schemeClr val="accent1">
-              <a:shade val="50000"/>
-            </a:schemeClr>
-          </a:lnRef>
-          <a:fillRef idx="1">
-            <a:schemeClr val="accent1"/>
-          </a:fillRef>
-          <a:effectRef idx="0">
-            <a:schemeClr val="accent1"/>
-          </a:effectRef>
-          <a:fontRef idx="minor">
-            <a:schemeClr val="lt1"/>
-          </a:fontRef>
-        </p:style>
-        <p:txBody>
-          <a:bodyPr rtlCol="0" anchor="t"/>
-          <a:lstStyle/>
-          <a:p>
-            <a:r>
-              <a:rPr kumimoji="1" lang="en-US" altLang="ko-KR" sz="700" dirty="0">
-                <a:solidFill>
-                  <a:schemeClr val="tx1">
-                    <a:lumMod val="75000"/>
-                    <a:lumOff val="25000"/>
-                  </a:schemeClr>
-                </a:solidFill>
-              </a:rPr>
-              <a:t>(1)</a:t>
-            </a:r>
-            <a:r>
-              <a:rPr kumimoji="1" lang="ko-KR" altLang="en-US" sz="700" dirty="0">
-                <a:solidFill>
-                  <a:schemeClr val="tx1">
-                    <a:lumMod val="75000"/>
-                    <a:lumOff val="25000"/>
-                  </a:schemeClr>
-                </a:solidFill>
-              </a:rPr>
-              <a:t> </a:t>
-            </a:r>
-            <a:r>
-              <a:rPr kumimoji="1" lang="ko-KR" altLang="en-US" sz="700" dirty="0" err="1">
-                <a:solidFill>
-                  <a:schemeClr val="tx1">
-                    <a:lumMod val="75000"/>
-                    <a:lumOff val="25000"/>
-                  </a:schemeClr>
-                </a:solidFill>
-              </a:rPr>
-              <a:t>라디오버튼</a:t>
-            </a:r>
-            <a:r>
-              <a:rPr kumimoji="1" lang="ko-KR" altLang="en-US" sz="700" dirty="0">
-                <a:solidFill>
-                  <a:schemeClr val="tx1">
-                    <a:lumMod val="75000"/>
-                    <a:lumOff val="25000"/>
-                  </a:schemeClr>
-                </a:solidFill>
-              </a:rPr>
-              <a:t> </a:t>
-            </a:r>
-            <a:r>
-              <a:rPr kumimoji="1" lang="en-US" altLang="ko-KR" sz="700" dirty="0">
-                <a:solidFill>
-                  <a:schemeClr val="tx1">
-                    <a:lumMod val="75000"/>
-                    <a:lumOff val="25000"/>
-                  </a:schemeClr>
-                </a:solidFill>
-              </a:rPr>
-              <a:t>3</a:t>
-            </a:r>
-            <a:r>
-              <a:rPr kumimoji="1" lang="ko-KR" altLang="en-US" sz="700" dirty="0">
-                <a:solidFill>
-                  <a:schemeClr val="tx1">
-                    <a:lumMod val="75000"/>
-                    <a:lumOff val="25000"/>
-                  </a:schemeClr>
-                </a:solidFill>
-              </a:rPr>
-              <a:t>개 배치</a:t>
-            </a:r>
-            <a:endParaRPr kumimoji="1" lang="en-US" altLang="ko-KR" sz="700" dirty="0">
-              <a:solidFill>
-                <a:schemeClr val="tx1">
-                  <a:lumMod val="75000"/>
-                  <a:lumOff val="25000"/>
-                </a:schemeClr>
-              </a:solidFill>
-            </a:endParaRPr>
-          </a:p>
-          <a:p>
-            <a:pPr marL="171450" indent="-171450">
-              <a:buFont typeface="Arial" panose="020B0604020202020204" pitchFamily="34" charset="0"/>
-              <a:buChar char="•"/>
-            </a:pPr>
-            <a:r>
-              <a:rPr kumimoji="1" lang="ko-KR" altLang="en-US" sz="700" dirty="0">
-                <a:solidFill>
-                  <a:schemeClr val="tx1">
-                    <a:lumMod val="75000"/>
-                    <a:lumOff val="25000"/>
-                  </a:schemeClr>
-                </a:solidFill>
-              </a:rPr>
-              <a:t>라디오버튼들을 감싸는 부모 </a:t>
-            </a:r>
-            <a:r>
-              <a:rPr kumimoji="1" lang="en-US" altLang="ko-KR" sz="700" dirty="0">
-                <a:solidFill>
-                  <a:schemeClr val="tx1">
-                    <a:lumMod val="75000"/>
-                    <a:lumOff val="25000"/>
-                  </a:schemeClr>
-                </a:solidFill>
-              </a:rPr>
-              <a:t>View</a:t>
-            </a:r>
-            <a:r>
-              <a:rPr kumimoji="1" lang="ko-KR" altLang="en-US" sz="700" dirty="0">
-                <a:solidFill>
-                  <a:schemeClr val="tx1">
-                    <a:lumMod val="75000"/>
-                    <a:lumOff val="25000"/>
-                  </a:schemeClr>
-                </a:solidFill>
-              </a:rPr>
-              <a:t>에 </a:t>
-            </a:r>
-            <a:r>
-              <a:rPr kumimoji="1" lang="en-US" altLang="ko-KR" sz="700" dirty="0">
-                <a:solidFill>
-                  <a:schemeClr val="tx1">
-                    <a:lumMod val="75000"/>
-                    <a:lumOff val="25000"/>
-                  </a:schemeClr>
-                </a:solidFill>
-              </a:rPr>
-              <a:t>“</a:t>
-            </a:r>
-            <a:r>
-              <a:rPr kumimoji="1" lang="en-US" altLang="ko-KR" sz="700" dirty="0" err="1">
-                <a:solidFill>
-                  <a:schemeClr val="tx1">
-                    <a:lumMod val="75000"/>
-                    <a:lumOff val="25000"/>
-                  </a:schemeClr>
-                </a:solidFill>
-              </a:rPr>
-              <a:t>RadioButtonGroup.IsGroupHolder</a:t>
-            </a:r>
-            <a:r>
-              <a:rPr kumimoji="1" lang="en-US" altLang="ko-KR" sz="700" dirty="0">
-                <a:solidFill>
-                  <a:schemeClr val="tx1">
-                    <a:lumMod val="75000"/>
-                    <a:lumOff val="25000"/>
-                  </a:schemeClr>
-                </a:solidFill>
-              </a:rPr>
-              <a:t>” </a:t>
-            </a:r>
-            <a:r>
-              <a:rPr kumimoji="1" lang="ko-KR" altLang="en-US" sz="700" dirty="0" err="1">
-                <a:solidFill>
-                  <a:schemeClr val="tx1">
-                    <a:lumMod val="75000"/>
-                    <a:lumOff val="25000"/>
-                  </a:schemeClr>
-                </a:solidFill>
-              </a:rPr>
-              <a:t>를</a:t>
-            </a:r>
-            <a:r>
-              <a:rPr kumimoji="1" lang="ko-KR" altLang="en-US" sz="700" dirty="0">
-                <a:solidFill>
-                  <a:schemeClr val="tx1">
-                    <a:lumMod val="75000"/>
-                    <a:lumOff val="25000"/>
-                  </a:schemeClr>
-                </a:solidFill>
-              </a:rPr>
-              <a:t> </a:t>
-            </a:r>
-            <a:r>
-              <a:rPr kumimoji="1" lang="en-US" altLang="ko-KR" sz="700" dirty="0">
-                <a:solidFill>
-                  <a:schemeClr val="tx1">
-                    <a:lumMod val="75000"/>
-                    <a:lumOff val="25000"/>
-                  </a:schemeClr>
-                </a:solidFill>
-              </a:rPr>
-              <a:t>true</a:t>
-            </a:r>
-            <a:r>
-              <a:rPr kumimoji="1" lang="ko-KR" altLang="en-US" sz="700" dirty="0">
-                <a:solidFill>
-                  <a:schemeClr val="tx1">
-                    <a:lumMod val="75000"/>
-                    <a:lumOff val="25000"/>
-                  </a:schemeClr>
-                </a:solidFill>
-              </a:rPr>
-              <a:t> 로 설정해 주면</a:t>
-            </a:r>
-            <a:r>
-              <a:rPr kumimoji="1" lang="en-US" altLang="ko-KR" sz="700" dirty="0">
-                <a:solidFill>
-                  <a:schemeClr val="tx1">
-                    <a:lumMod val="75000"/>
-                    <a:lumOff val="25000"/>
-                  </a:schemeClr>
-                </a:solidFill>
-              </a:rPr>
-              <a:t>,</a:t>
-            </a:r>
-            <a:r>
-              <a:rPr kumimoji="1" lang="ko-KR" altLang="en-US" sz="700" dirty="0">
-                <a:solidFill>
-                  <a:schemeClr val="tx1">
-                    <a:lumMod val="75000"/>
-                    <a:lumOff val="25000"/>
-                  </a:schemeClr>
-                </a:solidFill>
-              </a:rPr>
-              <a:t> </a:t>
-            </a:r>
-            <a:r>
-              <a:rPr kumimoji="1" lang="en-US" altLang="ko-KR" sz="700" dirty="0">
-                <a:solidFill>
-                  <a:schemeClr val="tx1">
-                    <a:lumMod val="75000"/>
-                    <a:lumOff val="25000"/>
-                  </a:schemeClr>
-                </a:solidFill>
-              </a:rPr>
-              <a:t> </a:t>
-            </a:r>
-            <a:r>
-              <a:rPr kumimoji="1" lang="ko-KR" altLang="en-US" sz="700" dirty="0">
-                <a:solidFill>
-                  <a:schemeClr val="tx1">
-                    <a:lumMod val="75000"/>
-                    <a:lumOff val="25000"/>
-                  </a:schemeClr>
-                </a:solidFill>
-              </a:rPr>
-              <a:t>자식들이 하나의 그룹으로 묶여서 동작함</a:t>
-            </a:r>
-            <a:r>
-              <a:rPr kumimoji="1" lang="en-US" altLang="ko-KR" sz="700" dirty="0">
-                <a:solidFill>
-                  <a:schemeClr val="tx1">
-                    <a:lumMod val="75000"/>
-                    <a:lumOff val="25000"/>
-                  </a:schemeClr>
-                </a:solidFill>
-              </a:rPr>
-              <a:t>.</a:t>
-            </a:r>
-            <a:br>
-              <a:rPr kumimoji="1" lang="en-US" altLang="ko-KR" sz="700" dirty="0">
-                <a:solidFill>
-                  <a:schemeClr val="tx1">
-                    <a:lumMod val="75000"/>
-                    <a:lumOff val="25000"/>
-                  </a:schemeClr>
-                </a:solidFill>
-              </a:rPr>
-            </a:br>
-            <a:endParaRPr kumimoji="1" lang="en-US" altLang="ko-KR" sz="700" dirty="0">
-              <a:solidFill>
-                <a:schemeClr val="tx1">
-                  <a:lumMod val="75000"/>
-                  <a:lumOff val="25000"/>
-                </a:schemeClr>
-              </a:solidFill>
-            </a:endParaRPr>
-          </a:p>
-          <a:p>
-            <a:pPr marL="171450" indent="-171450">
-              <a:buFont typeface="Arial" panose="020B0604020202020204" pitchFamily="34" charset="0"/>
-              <a:buChar char="•"/>
-            </a:pPr>
-            <a:r>
-              <a:rPr kumimoji="1" lang="ko-KR" altLang="en-US" sz="700" dirty="0">
-                <a:solidFill>
-                  <a:schemeClr val="tx1">
-                    <a:lumMod val="75000"/>
-                    <a:lumOff val="25000"/>
-                  </a:schemeClr>
-                </a:solidFill>
-              </a:rPr>
-              <a:t>첫번째 라디오버튼에 </a:t>
-            </a:r>
-            <a:r>
-              <a:rPr kumimoji="1" lang="en-US" altLang="ko-KR" sz="700" dirty="0" err="1">
-                <a:solidFill>
-                  <a:schemeClr val="tx1">
-                    <a:lumMod val="75000"/>
-                    <a:lumOff val="25000"/>
-                  </a:schemeClr>
-                </a:solidFill>
-              </a:rPr>
-              <a:t>IsSelected</a:t>
-            </a:r>
-            <a:r>
-              <a:rPr kumimoji="1" lang="en-US" altLang="ko-KR" sz="700" dirty="0">
-                <a:solidFill>
-                  <a:schemeClr val="tx1">
-                    <a:lumMod val="75000"/>
-                    <a:lumOff val="25000"/>
-                  </a:schemeClr>
-                </a:solidFill>
-              </a:rPr>
-              <a:t>=True</a:t>
-            </a:r>
-            <a:r>
-              <a:rPr kumimoji="1" lang="ko-KR" altLang="en-US" sz="700" dirty="0" err="1">
-                <a:solidFill>
-                  <a:schemeClr val="tx1">
-                    <a:lumMod val="75000"/>
-                    <a:lumOff val="25000"/>
-                  </a:schemeClr>
-                </a:solidFill>
-              </a:rPr>
-              <a:t>를</a:t>
-            </a:r>
-            <a:r>
-              <a:rPr kumimoji="1" lang="ko-KR" altLang="en-US" sz="700" dirty="0">
-                <a:solidFill>
-                  <a:schemeClr val="tx1">
-                    <a:lumMod val="75000"/>
-                    <a:lumOff val="25000"/>
-                  </a:schemeClr>
-                </a:solidFill>
-              </a:rPr>
-              <a:t> 설정하여 선택된 상태로 시작하도록 해봤음</a:t>
-            </a:r>
-            <a:r>
-              <a:rPr kumimoji="1" lang="en-US" altLang="ko-KR" sz="700" dirty="0">
-                <a:solidFill>
-                  <a:schemeClr val="tx1">
-                    <a:lumMod val="75000"/>
-                    <a:lumOff val="25000"/>
-                  </a:schemeClr>
-                </a:solidFill>
-              </a:rPr>
-              <a:t>.</a:t>
-            </a:r>
-            <a:r>
-              <a:rPr kumimoji="1" lang="ko-KR" altLang="en-US" sz="700" dirty="0">
-                <a:solidFill>
-                  <a:schemeClr val="tx1">
-                    <a:lumMod val="75000"/>
-                    <a:lumOff val="25000"/>
-                  </a:schemeClr>
-                </a:solidFill>
-              </a:rPr>
-              <a:t> </a:t>
-            </a:r>
-            <a:endParaRPr kumimoji="1" lang="en-US" altLang="ko-KR" sz="700" dirty="0">
-              <a:solidFill>
-                <a:schemeClr val="tx1">
-                  <a:lumMod val="75000"/>
-                  <a:lumOff val="25000"/>
-                </a:schemeClr>
-              </a:solidFill>
-            </a:endParaRPr>
-          </a:p>
-        </p:txBody>
-      </p:sp>
-      <p:sp>
-        <p:nvSpPr>
-          <p:cNvPr id="17" name="직사각형 16">
-            <a:extLst>
-              <a:ext uri="{FF2B5EF4-FFF2-40B4-BE49-F238E27FC236}">
-                <a16:creationId xmlns:a16="http://schemas.microsoft.com/office/drawing/2014/main" id="{19500AC4-00F2-9B48-97AF-48FD297C811E}"/>
-              </a:ext>
-            </a:extLst>
-          </p:cNvPr>
-          <p:cNvSpPr/>
-          <p:nvPr/>
-        </p:nvSpPr>
-        <p:spPr>
-          <a:xfrm>
-            <a:off x="6809874" y="1966628"/>
-            <a:ext cx="4202429" cy="239949"/>
-          </a:xfrm>
-          <a:prstGeom prst="rect">
-            <a:avLst/>
-          </a:prstGeom>
-          <a:noFill/>
-          <a:ln w="28575">
-            <a:solidFill>
-              <a:srgbClr val="FFC000"/>
-            </a:solidFill>
-          </a:ln>
-        </p:spPr>
-        <p:style>
-          <a:lnRef idx="2">
-            <a:schemeClr val="accent1">
-              <a:shade val="50000"/>
-            </a:schemeClr>
-          </a:lnRef>
-          <a:fillRef idx="1">
-            <a:schemeClr val="accent1"/>
-          </a:fillRef>
-          <a:effectRef idx="0">
-            <a:schemeClr val="accent1"/>
-          </a:effectRef>
-          <a:fontRef idx="minor">
-            <a:schemeClr val="lt1"/>
-          </a:fontRef>
-        </p:style>
-        <p:txBody>
-          <a:bodyPr rtlCol="0" anchor="ctr"/>
-          <a:lstStyle/>
-          <a:p>
-            <a:pPr algn="ctr"/>
-            <a:endParaRPr kumimoji="1" lang="ko-Kore-KR" altLang="en-US"/>
-          </a:p>
-        </p:txBody>
-      </p:sp>
-      <p:sp>
-        <p:nvSpPr>
-          <p:cNvPr id="18" name="직사각형 17">
-            <a:extLst>
-              <a:ext uri="{FF2B5EF4-FFF2-40B4-BE49-F238E27FC236}">
-                <a16:creationId xmlns:a16="http://schemas.microsoft.com/office/drawing/2014/main" id="{FC7A2776-37FF-E84E-A6CE-CDF1C6F045BA}"/>
-              </a:ext>
-            </a:extLst>
-          </p:cNvPr>
-          <p:cNvSpPr/>
-          <p:nvPr/>
-        </p:nvSpPr>
-        <p:spPr>
-          <a:xfrm>
-            <a:off x="8502567" y="2225985"/>
-            <a:ext cx="2509736" cy="713360"/>
-          </a:xfrm>
-          <a:prstGeom prst="rect">
-            <a:avLst/>
-          </a:prstGeom>
-          <a:solidFill>
-            <a:srgbClr val="FFC000"/>
-          </a:solidFill>
-          <a:ln w="28575">
-            <a:solidFill>
-              <a:srgbClr val="FFC000"/>
-            </a:solidFill>
-          </a:ln>
-        </p:spPr>
-        <p:style>
-          <a:lnRef idx="2">
-            <a:schemeClr val="accent1">
-              <a:shade val="50000"/>
-            </a:schemeClr>
-          </a:lnRef>
-          <a:fillRef idx="1">
-            <a:schemeClr val="accent1"/>
-          </a:fillRef>
-          <a:effectRef idx="0">
-            <a:schemeClr val="accent1"/>
-          </a:effectRef>
-          <a:fontRef idx="minor">
-            <a:schemeClr val="lt1"/>
-          </a:fontRef>
-        </p:style>
-        <p:txBody>
-          <a:bodyPr rtlCol="0" anchor="t"/>
-          <a:lstStyle/>
-          <a:p>
-            <a:r>
-              <a:rPr kumimoji="1" lang="en-US" altLang="ko-KR" sz="700" dirty="0">
-                <a:solidFill>
-                  <a:schemeClr val="tx1">
-                    <a:lumMod val="75000"/>
-                    <a:lumOff val="25000"/>
-                  </a:schemeClr>
-                </a:solidFill>
-              </a:rPr>
-              <a:t>(2)</a:t>
-            </a:r>
-            <a:r>
-              <a:rPr kumimoji="1" lang="ko-KR" altLang="en-US" sz="700" dirty="0">
-                <a:solidFill>
-                  <a:schemeClr val="tx1">
-                    <a:lumMod val="75000"/>
-                    <a:lumOff val="25000"/>
-                  </a:schemeClr>
-                </a:solidFill>
-              </a:rPr>
-              <a:t> 라디오 버튼에서 그룹을 가져와서 </a:t>
-            </a:r>
-            <a:r>
-              <a:rPr kumimoji="1" lang="en-US" altLang="ko-KR" sz="700" dirty="0" err="1">
-                <a:solidFill>
-                  <a:schemeClr val="tx1">
-                    <a:lumMod val="75000"/>
-                    <a:lumOff val="25000"/>
-                  </a:schemeClr>
-                </a:solidFill>
-              </a:rPr>
-              <a:t>SelectedChanged</a:t>
-            </a:r>
-            <a:r>
-              <a:rPr kumimoji="1" lang="en-US" altLang="ko-KR" sz="700" dirty="0">
-                <a:solidFill>
-                  <a:schemeClr val="tx1">
-                    <a:lumMod val="75000"/>
-                    <a:lumOff val="25000"/>
-                  </a:schemeClr>
-                </a:solidFill>
-              </a:rPr>
-              <a:t> </a:t>
-            </a:r>
-            <a:r>
-              <a:rPr kumimoji="1" lang="ko-KR" altLang="en-US" sz="700" dirty="0">
-                <a:solidFill>
-                  <a:schemeClr val="tx1">
-                    <a:lumMod val="75000"/>
-                    <a:lumOff val="25000"/>
-                  </a:schemeClr>
-                </a:solidFill>
-              </a:rPr>
-              <a:t>이벤트를 리슨</a:t>
-            </a:r>
-            <a:r>
-              <a:rPr kumimoji="1" lang="en-US" altLang="ko-KR" sz="700" dirty="0">
-                <a:solidFill>
-                  <a:schemeClr val="tx1">
-                    <a:lumMod val="75000"/>
-                    <a:lumOff val="25000"/>
-                  </a:schemeClr>
-                </a:solidFill>
-              </a:rPr>
-              <a:t>!</a:t>
-            </a:r>
-          </a:p>
-          <a:p>
-            <a:endParaRPr kumimoji="1" lang="en-US" altLang="ko-KR" sz="700" dirty="0">
-              <a:solidFill>
-                <a:schemeClr val="tx1">
-                  <a:lumMod val="75000"/>
-                  <a:lumOff val="25000"/>
-                </a:schemeClr>
-              </a:solidFill>
-            </a:endParaRPr>
-          </a:p>
-          <a:p>
-            <a:r>
-              <a:rPr kumimoji="1" lang="ko-KR" altLang="en-US" sz="700" dirty="0">
-                <a:solidFill>
-                  <a:schemeClr val="tx1">
-                    <a:lumMod val="75000"/>
-                    <a:lumOff val="25000"/>
-                  </a:schemeClr>
-                </a:solidFill>
-              </a:rPr>
-              <a:t>* </a:t>
-            </a:r>
-            <a:r>
-              <a:rPr kumimoji="1" lang="ko-KR" altLang="en-US" sz="700" dirty="0" err="1">
-                <a:solidFill>
-                  <a:schemeClr val="tx1">
-                    <a:lumMod val="75000"/>
-                    <a:lumOff val="25000"/>
-                  </a:schemeClr>
-                </a:solidFill>
-              </a:rPr>
-              <a:t>주의할점</a:t>
-            </a:r>
-            <a:r>
-              <a:rPr kumimoji="1" lang="en-US" altLang="ko-KR" sz="700" dirty="0">
-                <a:solidFill>
-                  <a:schemeClr val="tx1">
-                    <a:lumMod val="75000"/>
-                    <a:lumOff val="25000"/>
-                  </a:schemeClr>
-                </a:solidFill>
-              </a:rPr>
-              <a:t>:</a:t>
-            </a:r>
-            <a:r>
-              <a:rPr kumimoji="1" lang="ko-KR" altLang="en-US" sz="700" dirty="0">
-                <a:solidFill>
-                  <a:schemeClr val="tx1">
-                    <a:lumMod val="75000"/>
-                    <a:lumOff val="25000"/>
-                  </a:schemeClr>
-                </a:solidFill>
-              </a:rPr>
-              <a:t> </a:t>
-            </a:r>
-            <a:r>
-              <a:rPr kumimoji="1" lang="en-US" altLang="ko-KR" sz="700" dirty="0" err="1">
-                <a:solidFill>
-                  <a:schemeClr val="tx1">
-                    <a:lumMod val="75000"/>
-                    <a:lumOff val="25000"/>
-                  </a:schemeClr>
-                </a:solidFill>
-              </a:rPr>
-              <a:t>xaml</a:t>
-            </a:r>
-            <a:r>
-              <a:rPr kumimoji="1" lang="ko-KR" altLang="en-US" sz="700" dirty="0">
-                <a:solidFill>
-                  <a:schemeClr val="tx1">
-                    <a:lumMod val="75000"/>
-                    <a:lumOff val="25000"/>
-                  </a:schemeClr>
-                </a:solidFill>
-              </a:rPr>
-              <a:t>에서 </a:t>
-            </a:r>
-            <a:r>
-              <a:rPr kumimoji="1" lang="en-US" altLang="ko-KR" sz="700" dirty="0" err="1">
-                <a:solidFill>
-                  <a:schemeClr val="tx1">
-                    <a:lumMod val="75000"/>
-                    <a:lumOff val="25000"/>
-                  </a:schemeClr>
-                </a:solidFill>
-              </a:rPr>
-              <a:t>IsGroupHolder</a:t>
-            </a:r>
-            <a:r>
-              <a:rPr kumimoji="1" lang="ko-KR" altLang="en-US" sz="700" dirty="0" err="1">
-                <a:solidFill>
-                  <a:schemeClr val="tx1">
-                    <a:lumMod val="75000"/>
-                    <a:lumOff val="25000"/>
-                  </a:schemeClr>
-                </a:solidFill>
-              </a:rPr>
-              <a:t>를</a:t>
-            </a:r>
-            <a:r>
-              <a:rPr kumimoji="1" lang="ko-KR" altLang="en-US" sz="700" dirty="0">
-                <a:solidFill>
-                  <a:schemeClr val="tx1">
-                    <a:lumMod val="75000"/>
-                    <a:lumOff val="25000"/>
-                  </a:schemeClr>
-                </a:solidFill>
-              </a:rPr>
-              <a:t> </a:t>
-            </a:r>
-            <a:r>
-              <a:rPr kumimoji="1" lang="en-US" altLang="ko-KR" sz="700" dirty="0">
-                <a:solidFill>
-                  <a:schemeClr val="tx1">
-                    <a:lumMod val="75000"/>
-                    <a:lumOff val="25000"/>
-                  </a:schemeClr>
-                </a:solidFill>
-              </a:rPr>
-              <a:t>true</a:t>
-            </a:r>
-            <a:r>
-              <a:rPr kumimoji="1" lang="ko-KR" altLang="en-US" sz="700" dirty="0">
-                <a:solidFill>
-                  <a:schemeClr val="tx1">
-                    <a:lumMod val="75000"/>
-                    <a:lumOff val="25000"/>
-                  </a:schemeClr>
-                </a:solidFill>
-              </a:rPr>
-              <a:t>로 설정하지 않았다면</a:t>
-            </a:r>
-            <a:r>
-              <a:rPr kumimoji="1" lang="en-US" altLang="ko-KR" sz="700" dirty="0">
-                <a:solidFill>
-                  <a:schemeClr val="tx1">
-                    <a:lumMod val="75000"/>
-                    <a:lumOff val="25000"/>
-                  </a:schemeClr>
-                </a:solidFill>
-              </a:rPr>
-              <a:t>,</a:t>
-            </a:r>
-            <a:r>
-              <a:rPr kumimoji="1" lang="ko-KR" altLang="en-US" sz="700" dirty="0">
-                <a:solidFill>
-                  <a:schemeClr val="tx1">
-                    <a:lumMod val="75000"/>
-                    <a:lumOff val="25000"/>
-                  </a:schemeClr>
-                </a:solidFill>
-              </a:rPr>
-              <a:t>  그룹이 생성되지 않으므로 </a:t>
-            </a:r>
-            <a:r>
-              <a:rPr kumimoji="1" lang="en-US" altLang="ko-KR" sz="700" dirty="0">
-                <a:solidFill>
-                  <a:schemeClr val="tx1">
-                    <a:lumMod val="75000"/>
-                    <a:lumOff val="25000"/>
-                  </a:schemeClr>
-                </a:solidFill>
-              </a:rPr>
-              <a:t>Radio1.ItemGroup</a:t>
-            </a:r>
-            <a:r>
-              <a:rPr kumimoji="1" lang="ko-KR" altLang="en-US" sz="700" dirty="0">
-                <a:solidFill>
-                  <a:schemeClr val="tx1">
-                    <a:lumMod val="75000"/>
-                    <a:lumOff val="25000"/>
-                  </a:schemeClr>
-                </a:solidFill>
-              </a:rPr>
-              <a:t>은 </a:t>
-            </a:r>
-            <a:r>
-              <a:rPr kumimoji="1" lang="en-US" altLang="ko-KR" sz="700" dirty="0">
-                <a:solidFill>
-                  <a:schemeClr val="tx1">
-                    <a:lumMod val="75000"/>
-                    <a:lumOff val="25000"/>
-                  </a:schemeClr>
-                </a:solidFill>
-              </a:rPr>
-              <a:t>null</a:t>
-            </a:r>
-            <a:r>
-              <a:rPr kumimoji="1" lang="ko-KR" altLang="en-US" sz="700" dirty="0">
-                <a:solidFill>
-                  <a:schemeClr val="tx1">
-                    <a:lumMod val="75000"/>
-                    <a:lumOff val="25000"/>
-                  </a:schemeClr>
-                </a:solidFill>
-              </a:rPr>
-              <a:t>을 </a:t>
-            </a:r>
-            <a:r>
-              <a:rPr kumimoji="1" lang="ko-KR" altLang="en-US" sz="700" dirty="0" err="1">
-                <a:solidFill>
-                  <a:schemeClr val="tx1">
-                    <a:lumMod val="75000"/>
-                    <a:lumOff val="25000"/>
-                  </a:schemeClr>
-                </a:solidFill>
-              </a:rPr>
-              <a:t>리턴함</a:t>
-            </a:r>
-            <a:r>
-              <a:rPr kumimoji="1" lang="en-US" altLang="ko-KR" sz="700" dirty="0">
-                <a:solidFill>
-                  <a:schemeClr val="tx1">
-                    <a:lumMod val="75000"/>
-                    <a:lumOff val="25000"/>
-                  </a:schemeClr>
-                </a:solidFill>
-              </a:rPr>
-              <a:t>.</a:t>
-            </a:r>
-            <a:endParaRPr kumimoji="1" lang="ko-Kore-KR" altLang="en-US" sz="700" dirty="0">
-              <a:solidFill>
-                <a:schemeClr val="tx1">
-                  <a:lumMod val="75000"/>
-                  <a:lumOff val="25000"/>
-                </a:schemeClr>
-              </a:solidFill>
-            </a:endParaRPr>
-          </a:p>
-        </p:txBody>
-      </p:sp>
-      <p:sp>
-        <p:nvSpPr>
-          <p:cNvPr id="9" name="직사각형 8">
-            <a:extLst>
-              <a:ext uri="{FF2B5EF4-FFF2-40B4-BE49-F238E27FC236}">
-                <a16:creationId xmlns:a16="http://schemas.microsoft.com/office/drawing/2014/main" id="{185D5881-1641-7747-8C34-00097496B660}"/>
-              </a:ext>
-            </a:extLst>
-          </p:cNvPr>
-          <p:cNvSpPr/>
-          <p:nvPr/>
-        </p:nvSpPr>
-        <p:spPr>
-          <a:xfrm>
-            <a:off x="6809874" y="4093741"/>
-            <a:ext cx="4202429" cy="965147"/>
-          </a:xfrm>
-          <a:prstGeom prst="rect">
-            <a:avLst/>
-          </a:prstGeom>
-          <a:noFill/>
-          <a:ln w="28575">
-            <a:solidFill>
-              <a:srgbClr val="FFC000"/>
-            </a:solidFill>
-          </a:ln>
-        </p:spPr>
-        <p:style>
-          <a:lnRef idx="2">
-            <a:schemeClr val="accent1">
-              <a:shade val="50000"/>
-            </a:schemeClr>
-          </a:lnRef>
-          <a:fillRef idx="1">
-            <a:schemeClr val="accent1"/>
-          </a:fillRef>
-          <a:effectRef idx="0">
-            <a:schemeClr val="accent1"/>
-          </a:effectRef>
-          <a:fontRef idx="minor">
-            <a:schemeClr val="lt1"/>
-          </a:fontRef>
-        </p:style>
-        <p:txBody>
-          <a:bodyPr rtlCol="0" anchor="ctr"/>
-          <a:lstStyle/>
-          <a:p>
-            <a:pPr algn="ctr"/>
-            <a:endParaRPr kumimoji="1" lang="ko-Kore-KR" altLang="en-US"/>
-          </a:p>
-        </p:txBody>
-      </p:sp>
-      <p:sp>
-        <p:nvSpPr>
-          <p:cNvPr id="10" name="직사각형 9">
-            <a:extLst>
-              <a:ext uri="{FF2B5EF4-FFF2-40B4-BE49-F238E27FC236}">
-                <a16:creationId xmlns:a16="http://schemas.microsoft.com/office/drawing/2014/main" id="{138738E4-087C-3B4A-A950-CDDFBCF800E3}"/>
-              </a:ext>
-            </a:extLst>
-          </p:cNvPr>
-          <p:cNvSpPr/>
-          <p:nvPr/>
-        </p:nvSpPr>
-        <p:spPr>
-          <a:xfrm>
-            <a:off x="8998599" y="5058888"/>
-            <a:ext cx="2013704" cy="642026"/>
-          </a:xfrm>
-          <a:prstGeom prst="rect">
-            <a:avLst/>
-          </a:prstGeom>
-          <a:solidFill>
-            <a:srgbClr val="FFC000"/>
-          </a:solidFill>
-          <a:ln w="28575">
-            <a:solidFill>
-              <a:srgbClr val="FFC000"/>
-            </a:solidFill>
-          </a:ln>
-        </p:spPr>
-        <p:style>
-          <a:lnRef idx="2">
-            <a:schemeClr val="accent1">
-              <a:shade val="50000"/>
-            </a:schemeClr>
-          </a:lnRef>
-          <a:fillRef idx="1">
-            <a:schemeClr val="accent1"/>
-          </a:fillRef>
-          <a:effectRef idx="0">
-            <a:schemeClr val="accent1"/>
-          </a:effectRef>
-          <a:fontRef idx="minor">
-            <a:schemeClr val="lt1"/>
-          </a:fontRef>
-        </p:style>
-        <p:txBody>
-          <a:bodyPr rtlCol="0" anchor="t"/>
-          <a:lstStyle/>
-          <a:p>
-            <a:r>
-              <a:rPr kumimoji="1" lang="en-US" altLang="ko-KR" sz="700" dirty="0">
-                <a:solidFill>
-                  <a:schemeClr val="tx1">
-                    <a:lumMod val="75000"/>
-                    <a:lumOff val="25000"/>
-                  </a:schemeClr>
-                </a:solidFill>
-              </a:rPr>
-              <a:t>(3)</a:t>
-            </a:r>
-            <a:r>
-              <a:rPr kumimoji="1" lang="ko-KR" altLang="en-US" sz="700" dirty="0">
-                <a:solidFill>
-                  <a:schemeClr val="tx1">
-                    <a:lumMod val="75000"/>
-                    <a:lumOff val="25000"/>
-                  </a:schemeClr>
-                </a:solidFill>
-              </a:rPr>
-              <a:t> </a:t>
-            </a:r>
-            <a:r>
-              <a:rPr kumimoji="1" lang="en-US" altLang="ko-KR" sz="700" dirty="0" err="1">
-                <a:solidFill>
-                  <a:schemeClr val="tx1">
-                    <a:lumMod val="75000"/>
-                    <a:lumOff val="25000"/>
-                  </a:schemeClr>
-                </a:solidFill>
-              </a:rPr>
-              <a:t>OnRadioGroupChanged</a:t>
-            </a:r>
-            <a:r>
-              <a:rPr kumimoji="1" lang="en-US" altLang="ko-KR" sz="700" dirty="0">
-                <a:solidFill>
-                  <a:schemeClr val="tx1">
-                    <a:lumMod val="75000"/>
-                    <a:lumOff val="25000"/>
-                  </a:schemeClr>
-                </a:solidFill>
-              </a:rPr>
-              <a:t> </a:t>
-            </a:r>
-            <a:r>
-              <a:rPr kumimoji="1" lang="ko-KR" altLang="en-US" sz="700" dirty="0" err="1">
-                <a:solidFill>
-                  <a:schemeClr val="tx1">
-                    <a:lumMod val="75000"/>
-                    <a:lumOff val="25000"/>
-                  </a:schemeClr>
-                </a:solidFill>
-              </a:rPr>
-              <a:t>메소드</a:t>
-            </a:r>
-            <a:r>
-              <a:rPr kumimoji="1" lang="ko-KR" altLang="en-US" sz="700" dirty="0">
-                <a:solidFill>
-                  <a:schemeClr val="tx1">
-                    <a:lumMod val="75000"/>
-                    <a:lumOff val="25000"/>
-                  </a:schemeClr>
-                </a:solidFill>
-              </a:rPr>
-              <a:t> 정의 및 구현</a:t>
-            </a:r>
-            <a:endParaRPr kumimoji="1" lang="en-US" altLang="ko-KR" sz="700" dirty="0">
-              <a:solidFill>
-                <a:schemeClr val="tx1">
-                  <a:lumMod val="75000"/>
-                  <a:lumOff val="25000"/>
-                </a:schemeClr>
-              </a:solidFill>
-            </a:endParaRPr>
-          </a:p>
-          <a:p>
-            <a:endParaRPr kumimoji="1" lang="en-US" altLang="ko-KR" sz="700" dirty="0">
-              <a:solidFill>
-                <a:schemeClr val="tx1">
-                  <a:lumMod val="75000"/>
-                  <a:lumOff val="25000"/>
-                </a:schemeClr>
-              </a:solidFill>
-            </a:endParaRPr>
-          </a:p>
-          <a:p>
-            <a:r>
-              <a:rPr kumimoji="1" lang="ko-KR" altLang="en-US" sz="700" dirty="0">
-                <a:solidFill>
-                  <a:schemeClr val="tx1">
-                    <a:lumMod val="75000"/>
-                    <a:lumOff val="25000"/>
-                  </a:schemeClr>
-                </a:solidFill>
-              </a:rPr>
-              <a:t>* 그룹의 </a:t>
-            </a:r>
-            <a:r>
-              <a:rPr kumimoji="1" lang="en-US" altLang="ko-KR" sz="700" dirty="0">
-                <a:solidFill>
-                  <a:schemeClr val="tx1">
-                    <a:lumMod val="75000"/>
-                    <a:lumOff val="25000"/>
-                  </a:schemeClr>
-                </a:solidFill>
-              </a:rPr>
-              <a:t>selection</a:t>
-            </a:r>
-            <a:r>
-              <a:rPr kumimoji="1" lang="ko-KR" altLang="en-US" sz="700" dirty="0">
-                <a:solidFill>
-                  <a:schemeClr val="tx1">
-                    <a:lumMod val="75000"/>
-                    <a:lumOff val="25000"/>
-                  </a:schemeClr>
-                </a:solidFill>
-              </a:rPr>
-              <a:t>이 </a:t>
-            </a:r>
-            <a:r>
-              <a:rPr kumimoji="1" lang="ko-KR" altLang="en-US" sz="700" dirty="0" err="1">
-                <a:solidFill>
-                  <a:schemeClr val="tx1">
-                    <a:lumMod val="75000"/>
-                    <a:lumOff val="25000"/>
-                  </a:schemeClr>
-                </a:solidFill>
-              </a:rPr>
-              <a:t>바뀔때마다</a:t>
-            </a:r>
-            <a:r>
-              <a:rPr kumimoji="1" lang="ko-KR" altLang="en-US" sz="700" dirty="0">
-                <a:solidFill>
-                  <a:schemeClr val="tx1">
-                    <a:lumMod val="75000"/>
-                    <a:lumOff val="25000"/>
-                  </a:schemeClr>
-                </a:solidFill>
-              </a:rPr>
-              <a:t> 호출됨</a:t>
-            </a:r>
-            <a:r>
-              <a:rPr kumimoji="1" lang="en-US" altLang="ko-KR" sz="700" dirty="0">
-                <a:solidFill>
-                  <a:schemeClr val="tx1">
-                    <a:lumMod val="75000"/>
-                    <a:lumOff val="25000"/>
-                  </a:schemeClr>
-                </a:solidFill>
-              </a:rPr>
-              <a:t>.</a:t>
-            </a:r>
-          </a:p>
-          <a:p>
-            <a:r>
-              <a:rPr kumimoji="1" lang="ko-KR" altLang="en-US" sz="700" dirty="0">
-                <a:solidFill>
-                  <a:schemeClr val="tx1">
-                    <a:lumMod val="75000"/>
-                    <a:lumOff val="25000"/>
-                  </a:schemeClr>
-                </a:solidFill>
-              </a:rPr>
-              <a:t>* </a:t>
-            </a:r>
-            <a:r>
-              <a:rPr kumimoji="1" lang="ko-KR" altLang="en-US" sz="700" dirty="0" err="1">
-                <a:solidFill>
-                  <a:schemeClr val="tx1">
-                    <a:lumMod val="75000"/>
-                    <a:lumOff val="25000"/>
-                  </a:schemeClr>
-                </a:solidFill>
-              </a:rPr>
-              <a:t>호출될때마다</a:t>
-            </a:r>
-            <a:r>
-              <a:rPr kumimoji="1" lang="ko-KR" altLang="en-US" sz="700" dirty="0">
-                <a:solidFill>
-                  <a:schemeClr val="tx1">
-                    <a:lumMod val="75000"/>
-                    <a:lumOff val="25000"/>
-                  </a:schemeClr>
-                </a:solidFill>
-              </a:rPr>
-              <a:t> 상태를 </a:t>
-            </a:r>
-            <a:r>
-              <a:rPr kumimoji="1" lang="en-US" altLang="ko-KR" sz="700" dirty="0" err="1">
-                <a:solidFill>
-                  <a:schemeClr val="tx1">
-                    <a:lumMod val="75000"/>
-                    <a:lumOff val="25000"/>
-                  </a:schemeClr>
-                </a:solidFill>
-              </a:rPr>
-              <a:t>OutputText</a:t>
-            </a:r>
-            <a:r>
-              <a:rPr kumimoji="1" lang="ko-KR" altLang="en-US" sz="700" dirty="0">
-                <a:solidFill>
-                  <a:schemeClr val="tx1">
-                    <a:lumMod val="75000"/>
-                    <a:lumOff val="25000"/>
-                  </a:schemeClr>
-                </a:solidFill>
-              </a:rPr>
-              <a:t>에 업데이트</a:t>
-            </a:r>
-            <a:endParaRPr kumimoji="1" lang="ko-Kore-KR" altLang="en-US" sz="700" dirty="0">
-              <a:solidFill>
-                <a:schemeClr val="tx1">
-                  <a:lumMod val="75000"/>
-                  <a:lumOff val="25000"/>
-                </a:schemeClr>
-              </a:solidFill>
-            </a:endParaRPr>
-          </a:p>
-        </p:txBody>
-      </p:sp>
-    </p:spTree>
-    <p:extLst>
-      <p:ext uri="{BB962C8B-B14F-4D97-AF65-F5344CB8AC3E}">
-        <p14:creationId xmlns:p14="http://schemas.microsoft.com/office/powerpoint/2010/main" val="1044156602"/>
       </p:ext>
     </p:extLst>
   </p:cSld>

</xml_diff>